<commit_message>
added first version of final report
</commit_message>
<xml_diff>
--- a/presentation/PRESENTATION-CSIZG628T-2019HT66015_21Apr21.pptx
+++ b/presentation/PRESENTATION-CSIZG628T-2019HT66015_21Apr21.pptx
@@ -3295,7 +3295,7 @@
         <p:spPr>
           <a:xfrm>
             <a:off x="0" y="0"/>
-            <a:ext cx="10081440" cy="5665680"/>
+            <a:ext cx="10081080" cy="5665320"/>
           </a:xfrm>
           <a:prstGeom prst="rect">
             <a:avLst/>
@@ -3340,7 +3340,49 @@
                 </a:uFill>
                 <a:latin typeface="Arial"/>
               </a:rPr>
-              <a:t>Click to edit the title text format</a:t>
+              <a:t>Click to </a:t>
+            </a:r>
+            <a:r>
+              <a:rPr b="0" lang="en-US" sz="4400" spc="-1" strike="noStrike">
+                <a:solidFill>
+                  <a:srgbClr val="000000"/>
+                </a:solidFill>
+                <a:uFill>
+                  <a:solidFill>
+                    <a:srgbClr val="ffffff"/>
+                  </a:solidFill>
+                </a:uFill>
+                <a:latin typeface="Arial"/>
+              </a:rPr>
+              <a:t>edit the </a:t>
+            </a:r>
+            <a:r>
+              <a:rPr b="0" lang="en-US" sz="4400" spc="-1" strike="noStrike">
+                <a:solidFill>
+                  <a:srgbClr val="000000"/>
+                </a:solidFill>
+                <a:uFill>
+                  <a:solidFill>
+                    <a:srgbClr val="ffffff"/>
+                  </a:solidFill>
+                </a:uFill>
+                <a:latin typeface="Arial"/>
+              </a:rPr>
+              <a:t>title text </a:t>
+            </a:r>
+            <a:r>
+              <a:rPr b="0" lang="en-US" sz="4400" spc="-1" strike="noStrike">
+                <a:solidFill>
+                  <a:srgbClr val="000000"/>
+                </a:solidFill>
+                <a:uFill>
+                  <a:solidFill>
+                    <a:srgbClr val="ffffff"/>
+                  </a:solidFill>
+                </a:uFill>
+                <a:latin typeface="Arial"/>
+              </a:rPr>
+              <a:t>format</a:t>
             </a:r>
             <a:endParaRPr b="0" lang="en-US" sz="4400" spc="-1" strike="noStrike">
               <a:solidFill>
@@ -3697,7 +3739,7 @@
         <p:spPr>
           <a:xfrm>
             <a:off x="0" y="0"/>
-            <a:ext cx="10081440" cy="5665680"/>
+            <a:ext cx="10081080" cy="5665320"/>
           </a:xfrm>
           <a:prstGeom prst="rect">
             <a:avLst/>
@@ -4095,7 +4137,7 @@
         <p:spPr>
           <a:xfrm>
             <a:off x="1620000" y="1368000"/>
-            <a:ext cx="8095680" cy="3283920"/>
+            <a:ext cx="8095320" cy="3283560"/>
           </a:xfrm>
           <a:prstGeom prst="rect">
             <a:avLst/>
@@ -4455,7 +4497,7 @@
         <p:spPr>
           <a:xfrm>
             <a:off x="678600" y="253080"/>
-            <a:ext cx="8095680" cy="931680"/>
+            <a:ext cx="8095320" cy="931320"/>
           </a:xfrm>
           <a:prstGeom prst="rect">
             <a:avLst/>
@@ -4476,7 +4518,7 @@
             <a:normAutofit/>
           </a:bodyPr>
           <a:p>
-            <a:pPr lvl="2" marL="648000" indent="-211680" algn="ctr">
+            <a:pPr lvl="2" marL="648000" indent="-211320" algn="ctr">
               <a:lnSpc>
                 <a:spcPct val="100000"/>
               </a:lnSpc>
@@ -4525,7 +4567,7 @@
         <p:spPr>
           <a:xfrm>
             <a:off x="2430360" y="1319040"/>
-            <a:ext cx="6214320" cy="4258440"/>
+            <a:ext cx="6213960" cy="4258080"/>
           </a:xfrm>
           <a:prstGeom prst="rect">
             <a:avLst/>
@@ -4595,7 +4637,7 @@
             </a:endParaRPr>
           </a:p>
           <a:p>
-            <a:pPr marL="216000" indent="-215640">
+            <a:pPr marL="216000" indent="-215280">
               <a:lnSpc>
                 <a:spcPct val="100000"/>
               </a:lnSpc>
@@ -4634,7 +4676,7 @@
             </a:endParaRPr>
           </a:p>
           <a:p>
-            <a:pPr marL="216000" indent="-215640">
+            <a:pPr marL="216000" indent="-215280">
               <a:lnSpc>
                 <a:spcPct val="100000"/>
               </a:lnSpc>
@@ -4742,7 +4784,7 @@
             </a:endParaRPr>
           </a:p>
           <a:p>
-            <a:pPr marL="457200" indent="-215640">
+            <a:pPr marL="457200" indent="-215280">
               <a:lnSpc>
                 <a:spcPct val="115000"/>
               </a:lnSpc>
@@ -4781,7 +4823,7 @@
             </a:endParaRPr>
           </a:p>
           <a:p>
-            <a:pPr marL="457200" indent="-215640">
+            <a:pPr marL="457200" indent="-215280">
               <a:lnSpc>
                 <a:spcPct val="115000"/>
               </a:lnSpc>
@@ -4820,7 +4862,7 @@
             </a:endParaRPr>
           </a:p>
           <a:p>
-            <a:pPr marL="457200" indent="-215640">
+            <a:pPr marL="457200" indent="-215280">
               <a:lnSpc>
                 <a:spcPct val="115000"/>
               </a:lnSpc>
@@ -4859,7 +4901,7 @@
             </a:endParaRPr>
           </a:p>
           <a:p>
-            <a:pPr marL="457200" indent="-215640">
+            <a:pPr marL="457200" indent="-215280">
               <a:lnSpc>
                 <a:spcPct val="115000"/>
               </a:lnSpc>
@@ -4898,7 +4940,7 @@
             </a:endParaRPr>
           </a:p>
           <a:p>
-            <a:pPr marL="457200" indent="-215640">
+            <a:pPr marL="457200" indent="-215280">
               <a:lnSpc>
                 <a:spcPct val="115000"/>
               </a:lnSpc>
@@ -4937,7 +4979,7 @@
             </a:endParaRPr>
           </a:p>
           <a:p>
-            <a:pPr marL="457200" indent="-215640">
+            <a:pPr marL="457200" indent="-215280">
               <a:lnSpc>
                 <a:spcPct val="115000"/>
               </a:lnSpc>
@@ -4976,7 +5018,7 @@
             </a:endParaRPr>
           </a:p>
           <a:p>
-            <a:pPr marL="457200" indent="-215640">
+            <a:pPr marL="457200" indent="-215280">
               <a:lnSpc>
                 <a:spcPct val="115000"/>
               </a:lnSpc>
@@ -5214,7 +5256,7 @@
         <p:spPr>
           <a:xfrm>
             <a:off x="2103120" y="3679560"/>
-            <a:ext cx="4660200" cy="367920"/>
+            <a:ext cx="4659840" cy="367560"/>
           </a:xfrm>
           <a:prstGeom prst="rect">
             <a:avLst/>
@@ -5289,7 +5331,7 @@
         <p:spPr>
           <a:xfrm>
             <a:off x="3108960" y="1828800"/>
-            <a:ext cx="4572000" cy="1645920"/>
+            <a:ext cx="4571640" cy="1645560"/>
           </a:xfrm>
           <a:prstGeom prst="rect">
             <a:avLst/>
@@ -5319,6 +5361,7 @@
                   </a:solidFill>
                 </a:uFill>
                 <a:latin typeface="Arial"/>
+                <a:ea typeface="DejaVu Sans"/>
               </a:rPr>
               <a:t>DEMONSTRATION VIDEO</a:t>
             </a:r>
@@ -5348,7 +5391,10 @@
             </a:endParaRPr>
           </a:p>
           <a:p>
-            <a:pPr marL="216000" indent="-216000">
+            <a:pPr marL="216000" indent="-215640">
+              <a:lnSpc>
+                <a:spcPct val="100000"/>
+              </a:lnSpc>
               <a:buClr>
                 <a:srgbClr val="000000"/>
               </a:buClr>
@@ -5366,6 +5412,7 @@
                   </a:solidFill>
                 </a:uFill>
                 <a:latin typeface="Arial"/>
+                <a:ea typeface="DejaVu Sans"/>
               </a:rPr>
               <a:t>Automation using Ansible</a:t>
             </a:r>
@@ -5382,7 +5429,10 @@
             </a:endParaRPr>
           </a:p>
           <a:p>
-            <a:pPr marL="216000" indent="-216000">
+            <a:pPr marL="216000" indent="-215640">
+              <a:lnSpc>
+                <a:spcPct val="100000"/>
+              </a:lnSpc>
               <a:buClr>
                 <a:srgbClr val="000000"/>
               </a:buClr>
@@ -5400,6 +5450,7 @@
                   </a:solidFill>
                 </a:uFill>
                 <a:latin typeface="Arial"/>
+                <a:ea typeface="DejaVu Sans"/>
               </a:rPr>
               <a:t>Monitoring with Prometheus</a:t>
             </a:r>
@@ -5416,7 +5467,10 @@
             </a:endParaRPr>
           </a:p>
           <a:p>
-            <a:pPr marL="216000" indent="-216000">
+            <a:pPr marL="216000" indent="-215640">
+              <a:lnSpc>
+                <a:spcPct val="100000"/>
+              </a:lnSpc>
               <a:buClr>
                 <a:srgbClr val="000000"/>
               </a:buClr>
@@ -5434,6 +5488,7 @@
                   </a:solidFill>
                 </a:uFill>
                 <a:latin typeface="Arial"/>
+                <a:ea typeface="DejaVu Sans"/>
               </a:rPr>
               <a:t>Visualization and Alerting with Grafana</a:t>
             </a:r>
@@ -5509,7 +5564,7 @@
         <p:spPr>
           <a:xfrm>
             <a:off x="678600" y="253080"/>
-            <a:ext cx="8095680" cy="931680"/>
+            <a:ext cx="8095320" cy="931320"/>
           </a:xfrm>
           <a:prstGeom prst="rect">
             <a:avLst/>
@@ -5530,7 +5585,7 @@
             <a:normAutofit/>
           </a:bodyPr>
           <a:p>
-            <a:pPr lvl="2" marL="648000" indent="-211680" algn="ctr">
+            <a:pPr lvl="2" marL="648000" indent="-211320" algn="ctr">
               <a:lnSpc>
                 <a:spcPct val="100000"/>
               </a:lnSpc>
@@ -5572,14 +5627,14 @@
       </p:sp>
       <p:sp>
         <p:nvSpPr>
-          <p:cNvPr id="122" name="TextShape 2"/>
-          <p:cNvSpPr txBox="1"/>
+          <p:cNvPr id="122" name="CustomShape 2"/>
+          <p:cNvSpPr/>
           <p:nvPr/>
         </p:nvSpPr>
         <p:spPr>
           <a:xfrm>
             <a:off x="2103120" y="1097280"/>
-            <a:ext cx="6858000" cy="4469040"/>
+            <a:ext cx="6857640" cy="4468680"/>
           </a:xfrm>
           <a:prstGeom prst="rect">
             <a:avLst/>
@@ -5589,10 +5644,16 @@
             <a:noFill/>
           </a:ln>
         </p:spPr>
+        <p:style>
+          <a:lnRef idx="0"/>
+          <a:fillRef idx="0"/>
+          <a:effectRef idx="0"/>
+          <a:fontRef idx="minor"/>
+        </p:style>
         <p:txBody>
           <a:bodyPr lIns="90000" rIns="90000" tIns="45000" bIns="45000"/>
           <a:p>
-            <a:pPr marL="216000" indent="-216000">
+            <a:pPr marL="216000" indent="-215640">
               <a:lnSpc>
                 <a:spcPct val="115000"/>
               </a:lnSpc>
@@ -5630,7 +5691,25 @@
             </a:endParaRPr>
           </a:p>
           <a:p>
-            <a:pPr marL="216000" indent="-216000">
+            <a:pPr>
+              <a:lnSpc>
+                <a:spcPct val="115000"/>
+              </a:lnSpc>
+            </a:pPr>
+            <a:endParaRPr b="0" lang="en-US" sz="1600" spc="-1" strike="noStrike">
+              <a:solidFill>
+                <a:srgbClr val="000000"/>
+              </a:solidFill>
+              <a:uFill>
+                <a:solidFill>
+                  <a:srgbClr val="ffffff"/>
+                </a:solidFill>
+              </a:uFill>
+              <a:latin typeface="Arial"/>
+            </a:endParaRPr>
+          </a:p>
+          <a:p>
+            <a:pPr marL="216000" indent="-215640">
               <a:lnSpc>
                 <a:spcPct val="115000"/>
               </a:lnSpc>
@@ -5641,6 +5720,20 @@
               <a:buFont typeface="Wingdings" charset="2"/>
               <a:buChar char=""/>
             </a:pPr>
+            <a:r>
+              <a:rPr b="0" lang="en-US" sz="1600" spc="-1" strike="noStrike">
+                <a:solidFill>
+                  <a:srgbClr val="000000"/>
+                </a:solidFill>
+                <a:uFill>
+                  <a:solidFill>
+                    <a:srgbClr val="ffffff"/>
+                  </a:solidFill>
+                </a:uFill>
+                <a:latin typeface="Arial"/>
+              </a:rPr>
+              <a:t>Create additional custom metrics for analysing the server behaviour and performance. For example response times to the client requests, number of clients connected to the server can be added to the future scope of the project. </a:t>
+            </a:r>
             <a:endParaRPr b="0" lang="en-US" sz="1600" spc="-1" strike="noStrike">
               <a:solidFill>
                 <a:srgbClr val="000000"/>
@@ -5654,7 +5747,25 @@
             </a:endParaRPr>
           </a:p>
           <a:p>
-            <a:pPr marL="216000" indent="-216000">
+            <a:pPr>
+              <a:lnSpc>
+                <a:spcPct val="115000"/>
+              </a:lnSpc>
+            </a:pPr>
+            <a:endParaRPr b="0" lang="en-US" sz="1600" spc="-1" strike="noStrike">
+              <a:solidFill>
+                <a:srgbClr val="000000"/>
+              </a:solidFill>
+              <a:uFill>
+                <a:solidFill>
+                  <a:srgbClr val="ffffff"/>
+                </a:solidFill>
+              </a:uFill>
+              <a:latin typeface="Arial"/>
+            </a:endParaRPr>
+          </a:p>
+          <a:p>
+            <a:pPr marL="216000" indent="-215640">
               <a:lnSpc>
                 <a:spcPct val="115000"/>
               </a:lnSpc>
@@ -5677,7 +5788,7 @@
                 </a:uFill>
                 <a:latin typeface="Arial"/>
               </a:rPr>
-              <a:t>Create additional custom metrics for analysing the server behaviour and performance. For example response times to the client requests, number of clients connected to the server can be added to the future scope of the project. </a:t>
+              <a:t>The study can replace TCP Echo Server with any other server like webservers, app servers or db servers by changing a single DockerFile configuration to address the problem of Site Reliability on those servers. </a:t>
             </a:r>
             <a:endParaRPr b="0" lang="en-US" sz="1600" spc="-1" strike="noStrike">
               <a:solidFill>
@@ -5692,16 +5803,10 @@
             </a:endParaRPr>
           </a:p>
           <a:p>
-            <a:pPr marL="216000" indent="-216000">
+            <a:pPr>
               <a:lnSpc>
                 <a:spcPct val="115000"/>
               </a:lnSpc>
-              <a:buClr>
-                <a:srgbClr val="000000"/>
-              </a:buClr>
-              <a:buSzPct val="45000"/>
-              <a:buFont typeface="Wingdings" charset="2"/>
-              <a:buChar char=""/>
             </a:pPr>
             <a:endParaRPr b="0" lang="en-US" sz="1600" spc="-1" strike="noStrike">
               <a:solidFill>
@@ -5716,69 +5821,7 @@
             </a:endParaRPr>
           </a:p>
           <a:p>
-            <a:pPr marL="216000" indent="-216000">
-              <a:lnSpc>
-                <a:spcPct val="115000"/>
-              </a:lnSpc>
-              <a:buClr>
-                <a:srgbClr val="000000"/>
-              </a:buClr>
-              <a:buSzPct val="45000"/>
-              <a:buFont typeface="Wingdings" charset="2"/>
-              <a:buChar char=""/>
-            </a:pPr>
-            <a:r>
-              <a:rPr b="0" lang="en-US" sz="1600" spc="-1" strike="noStrike">
-                <a:solidFill>
-                  <a:srgbClr val="000000"/>
-                </a:solidFill>
-                <a:uFill>
-                  <a:solidFill>
-                    <a:srgbClr val="ffffff"/>
-                  </a:solidFill>
-                </a:uFill>
-                <a:latin typeface="Arial"/>
-              </a:rPr>
-              <a:t>The study can replace TCP Echo Server with any other server like webservers, app servers or db servers by changing a single DockerFile configuration to address the problem of Site Reliability on those servers. </a:t>
-            </a:r>
-            <a:endParaRPr b="0" lang="en-US" sz="1600" spc="-1" strike="noStrike">
-              <a:solidFill>
-                <a:srgbClr val="000000"/>
-              </a:solidFill>
-              <a:uFill>
-                <a:solidFill>
-                  <a:srgbClr val="ffffff"/>
-                </a:solidFill>
-              </a:uFill>
-              <a:latin typeface="Arial"/>
-            </a:endParaRPr>
-          </a:p>
-          <a:p>
-            <a:pPr marL="216000" indent="-216000">
-              <a:lnSpc>
-                <a:spcPct val="115000"/>
-              </a:lnSpc>
-              <a:buClr>
-                <a:srgbClr val="000000"/>
-              </a:buClr>
-              <a:buSzPct val="45000"/>
-              <a:buFont typeface="Wingdings" charset="2"/>
-              <a:buChar char=""/>
-            </a:pPr>
-            <a:endParaRPr b="0" lang="en-US" sz="1600" spc="-1" strike="noStrike">
-              <a:solidFill>
-                <a:srgbClr val="000000"/>
-              </a:solidFill>
-              <a:uFill>
-                <a:solidFill>
-                  <a:srgbClr val="ffffff"/>
-                </a:solidFill>
-              </a:uFill>
-              <a:latin typeface="Arial"/>
-            </a:endParaRPr>
-          </a:p>
-          <a:p>
-            <a:pPr marL="216000" indent="-216000">
+            <a:pPr marL="216000" indent="-215640">
               <a:lnSpc>
                 <a:spcPct val="115000"/>
               </a:lnSpc>
@@ -5875,7 +5918,7 @@
         <p:spPr>
           <a:xfrm>
             <a:off x="4023360" y="1463040"/>
-            <a:ext cx="3382920" cy="456840"/>
+            <a:ext cx="3382560" cy="456480"/>
           </a:xfrm>
           <a:prstGeom prst="rect">
             <a:avLst/>
@@ -5905,6 +5948,7 @@
                   </a:solidFill>
                 </a:uFill>
                 <a:latin typeface="Arial"/>
+                <a:ea typeface="DejaVu Sans"/>
               </a:rPr>
               <a:t>THANK YOU...</a:t>
             </a:r>
@@ -5980,7 +6024,7 @@
         <p:spPr>
           <a:xfrm>
             <a:off x="2011680" y="640080"/>
-            <a:ext cx="7040520" cy="5076360"/>
+            <a:ext cx="7040160" cy="5076000"/>
           </a:xfrm>
           <a:prstGeom prst="rect">
             <a:avLst/>
@@ -6023,6 +6067,7 @@
                   </a:solidFill>
                 </a:uFill>
                 <a:latin typeface="Verdana"/>
+                <a:ea typeface="DejaVu Sans"/>
               </a:rPr>
               <a:t>ID No. </a:t>
             </a:r>
@@ -6037,6 +6082,7 @@
                   </a:solidFill>
                 </a:uFill>
                 <a:latin typeface="Verdana"/>
+                <a:ea typeface="DejaVu Sans"/>
               </a:rPr>
               <a:t>	</a:t>
             </a:r>
@@ -6051,6 +6097,7 @@
                   </a:solidFill>
                 </a:uFill>
                 <a:latin typeface="Verdana"/>
+                <a:ea typeface="DejaVu Sans"/>
               </a:rPr>
               <a:t>	</a:t>
             </a:r>
@@ -6065,6 +6112,7 @@
                   </a:solidFill>
                 </a:uFill>
                 <a:latin typeface="Verdana"/>
+                <a:ea typeface="DejaVu Sans"/>
               </a:rPr>
               <a:t>	</a:t>
             </a:r>
@@ -6079,6 +6127,7 @@
                   </a:solidFill>
                 </a:uFill>
                 <a:latin typeface="Verdana"/>
+                <a:ea typeface="DejaVu Sans"/>
               </a:rPr>
               <a:t>	</a:t>
             </a:r>
@@ -6093,6 +6142,7 @@
                   </a:solidFill>
                 </a:uFill>
                 <a:latin typeface="Verdana"/>
+                <a:ea typeface="DejaVu Sans"/>
               </a:rPr>
               <a:t>	</a:t>
             </a:r>
@@ -6107,6 +6157,7 @@
                   </a:solidFill>
                 </a:uFill>
                 <a:latin typeface="Verdana"/>
+                <a:ea typeface="DejaVu Sans"/>
               </a:rPr>
               <a:t>: 2019HT66015</a:t>
             </a:r>
@@ -7584,7 +7635,7 @@
         <p:spPr>
           <a:xfrm>
             <a:off x="1596600" y="-109080"/>
-            <a:ext cx="8095680" cy="931680"/>
+            <a:ext cx="8095320" cy="931320"/>
           </a:xfrm>
           <a:prstGeom prst="rect">
             <a:avLst/>
@@ -7697,7 +7748,7 @@
         <p:spPr>
           <a:xfrm>
             <a:off x="7040880" y="822960"/>
-            <a:ext cx="2102760" cy="365400"/>
+            <a:ext cx="2102400" cy="365040"/>
           </a:xfrm>
           <a:prstGeom prst="wedgeRoundRectCallout">
             <a:avLst>
@@ -7800,7 +7851,7 @@
         <p:spPr>
           <a:xfrm>
             <a:off x="2079720" y="822960"/>
-            <a:ext cx="2194200" cy="548280"/>
+            <a:ext cx="2193840" cy="547920"/>
           </a:xfrm>
           <a:prstGeom prst="wedgeRoundRectCallout">
             <a:avLst>
@@ -7940,7 +7991,7 @@
         <p:spPr>
           <a:xfrm>
             <a:off x="4425840" y="1539720"/>
-            <a:ext cx="2066040" cy="2208960"/>
+            <a:ext cx="2065680" cy="2208600"/>
           </a:xfrm>
           <a:prstGeom prst="rect">
             <a:avLst/>
@@ -7959,7 +8010,7 @@
         <p:spPr>
           <a:xfrm>
             <a:off x="4920480" y="3017520"/>
-            <a:ext cx="1096920" cy="548280"/>
+            <a:ext cx="1096560" cy="547920"/>
           </a:xfrm>
           <a:prstGeom prst="rect">
             <a:avLst/>
@@ -7989,6 +8040,7 @@
                   </a:solidFill>
                 </a:uFill>
                 <a:latin typeface="DejaVu Sans"/>
+                <a:ea typeface="DejaVu Sans"/>
               </a:rPr>
               <a:t>End User</a:t>
             </a:r>
@@ -8015,7 +8067,7 @@
         <p:spPr>
           <a:xfrm>
             <a:off x="1645920" y="2011680"/>
-            <a:ext cx="2194200" cy="456840"/>
+            <a:ext cx="2193840" cy="456480"/>
           </a:xfrm>
           <a:prstGeom prst="wedgeRoundRectCallout">
             <a:avLst>
@@ -8118,7 +8170,7 @@
         <p:spPr>
           <a:xfrm>
             <a:off x="7315200" y="2011680"/>
-            <a:ext cx="2285640" cy="456840"/>
+            <a:ext cx="2285280" cy="456480"/>
           </a:xfrm>
           <a:prstGeom prst="wedgeRoundRectCallout">
             <a:avLst>
@@ -8221,7 +8273,7 @@
         <p:spPr>
           <a:xfrm>
             <a:off x="1737360" y="3657600"/>
-            <a:ext cx="2194200" cy="639720"/>
+            <a:ext cx="2193840" cy="639360"/>
           </a:xfrm>
           <a:prstGeom prst="wedgeRoundRectCallout">
             <a:avLst>
@@ -8390,7 +8442,7 @@
         <p:spPr>
           <a:xfrm>
             <a:off x="7315200" y="3474720"/>
-            <a:ext cx="2559960" cy="548280"/>
+            <a:ext cx="2559600" cy="547920"/>
           </a:xfrm>
           <a:prstGeom prst="wedgeRoundRectCallout">
             <a:avLst>
@@ -8493,7 +8545,7 @@
         <p:spPr>
           <a:xfrm>
             <a:off x="6035040" y="4389120"/>
-            <a:ext cx="2559960" cy="456840"/>
+            <a:ext cx="2559600" cy="456480"/>
           </a:xfrm>
           <a:prstGeom prst="wedgeRoundRectCallout">
             <a:avLst>
@@ -8563,7 +8615,7 @@
         <p:spPr>
           <a:xfrm>
             <a:off x="1596600" y="-109080"/>
-            <a:ext cx="8095680" cy="931680"/>
+            <a:ext cx="8095320" cy="931320"/>
           </a:xfrm>
           <a:prstGeom prst="rect">
             <a:avLst/>
@@ -8676,7 +8728,7 @@
         <p:spPr>
           <a:xfrm>
             <a:off x="1828800" y="792720"/>
-            <a:ext cx="3291480" cy="1584360"/>
+            <a:ext cx="3291120" cy="1584000"/>
           </a:xfrm>
           <a:prstGeom prst="rect">
             <a:avLst/>
@@ -8721,6 +8773,7 @@
                   </a:solidFill>
                 </a:uFill>
                 <a:latin typeface="Arial"/>
+                <a:ea typeface="DejaVu Sans"/>
               </a:rPr>
               <a:t>A </a:t>
             </a:r>
@@ -8735,6 +8788,7 @@
                   </a:solidFill>
                 </a:uFill>
                 <a:latin typeface="Arial"/>
+                <a:ea typeface="DejaVu Sans"/>
               </a:rPr>
               <a:t>Site</a:t>
             </a:r>
@@ -8749,6 +8803,7 @@
                   </a:solidFill>
                 </a:uFill>
                 <a:latin typeface="Arial"/>
+                <a:ea typeface="DejaVu Sans"/>
               </a:rPr>
               <a:t> can be defined as any useful application or software available for use over computer networks which is accessible over the Internet or private interconnected networks.</a:t>
             </a:r>
@@ -8775,7 +8830,7 @@
         <p:spPr>
           <a:xfrm>
             <a:off x="5577840" y="709560"/>
-            <a:ext cx="4297320" cy="1678680"/>
+            <a:ext cx="4296960" cy="1678320"/>
           </a:xfrm>
           <a:prstGeom prst="rect">
             <a:avLst/>
@@ -8807,6 +8862,7 @@
                   </a:solidFill>
                 </a:uFill>
                 <a:latin typeface="Arial"/>
+                <a:ea typeface="DejaVu Sans"/>
               </a:rPr>
               <a:t>Reliability </a:t>
             </a:r>
@@ -8821,6 +8877,7 @@
                   </a:solidFill>
                 </a:uFill>
                 <a:latin typeface="Arial"/>
+                <a:ea typeface="DejaVu Sans"/>
               </a:rPr>
               <a:t>of a Site</a:t>
             </a:r>
@@ -8850,7 +8907,7 @@
             </a:endParaRPr>
           </a:p>
           <a:p>
-            <a:pPr marL="216000" indent="-215640">
+            <a:pPr marL="216000" indent="-215280">
               <a:lnSpc>
                 <a:spcPct val="100000"/>
               </a:lnSpc>
@@ -8872,6 +8929,7 @@
                   </a:solidFill>
                 </a:uFill>
                 <a:latin typeface="Arial"/>
+                <a:ea typeface="DejaVu Sans"/>
               </a:rPr>
               <a:t>Reliability is directly associated with user experience.</a:t>
             </a:r>
@@ -8906,7 +8964,7 @@
             </a:endParaRPr>
           </a:p>
           <a:p>
-            <a:pPr marL="216000" indent="-215640">
+            <a:pPr marL="216000" indent="-215280">
               <a:lnSpc>
                 <a:spcPct val="100000"/>
               </a:lnSpc>
@@ -8928,6 +8986,7 @@
                   </a:solidFill>
                 </a:uFill>
                 <a:latin typeface="Arial"/>
+                <a:ea typeface="DejaVu Sans"/>
               </a:rPr>
               <a:t>From the perspective of the service provider, they would have to satisfy the expectations of the end users and facilitate the best experience.</a:t>
             </a:r>
@@ -8954,7 +9013,7 @@
         <p:spPr>
           <a:xfrm>
             <a:off x="2286000" y="2834640"/>
-            <a:ext cx="7131960" cy="2377080"/>
+            <a:ext cx="7131600" cy="2376720"/>
           </a:xfrm>
           <a:prstGeom prst="rect">
             <a:avLst/>
@@ -8986,6 +9045,7 @@
                   </a:solidFill>
                 </a:uFill>
                 <a:latin typeface="Arial"/>
+                <a:ea typeface="DejaVu Sans"/>
               </a:rPr>
               <a:t>A reliable site is one where the users of the sites would fall back for the services of the service provider. </a:t>
             </a:r>
@@ -9026,6 +9086,7 @@
                   </a:solidFill>
                 </a:uFill>
                 <a:latin typeface="Arial"/>
+                <a:ea typeface="DejaVu Sans"/>
               </a:rPr>
               <a:t>Sites are considered reliable from user experience perspective, which becomes the primary goal for anyone providing information services.</a:t>
             </a:r>
@@ -9066,6 +9127,7 @@
                   </a:solidFill>
                 </a:uFill>
                 <a:latin typeface="Arial"/>
+                <a:ea typeface="DejaVu Sans"/>
               </a:rPr>
               <a:t>When reliable services are realized with the hosted websites, then the sites are meant to have an added quality called as </a:t>
             </a:r>
@@ -9080,6 +9142,7 @@
                   </a:solidFill>
                 </a:uFill>
                 <a:latin typeface="Arial"/>
+                <a:ea typeface="DejaVu Sans"/>
               </a:rPr>
               <a:t>Site Reliability.</a:t>
             </a:r>
@@ -9120,6 +9183,7 @@
                   </a:solidFill>
                 </a:uFill>
                 <a:latin typeface="Arial"/>
+                <a:ea typeface="DejaVu Sans"/>
               </a:rPr>
               <a:t>The art of practicing the principles to meet the expectations from reliability perspective can be named as </a:t>
             </a:r>
@@ -9134,6 +9198,7 @@
                   </a:solidFill>
                 </a:uFill>
                 <a:latin typeface="Arial"/>
+                <a:ea typeface="DejaVu Sans"/>
               </a:rPr>
               <a:t>Site Reliability Engineering.</a:t>
             </a:r>
@@ -9160,7 +9225,7 @@
         <p:spPr>
           <a:xfrm>
             <a:off x="1596600" y="-109080"/>
-            <a:ext cx="8095680" cy="931680"/>
+            <a:ext cx="8095320" cy="931320"/>
           </a:xfrm>
           <a:prstGeom prst="rect">
             <a:avLst/>
@@ -9273,7 +9338,7 @@
         <p:spPr>
           <a:xfrm>
             <a:off x="1620000" y="216000"/>
-            <a:ext cx="8095680" cy="931680"/>
+            <a:ext cx="8095320" cy="931320"/>
           </a:xfrm>
           <a:prstGeom prst="rect">
             <a:avLst/>
@@ -9337,7 +9402,7 @@
         <p:spPr>
           <a:xfrm>
             <a:off x="1779480" y="1463040"/>
-            <a:ext cx="8095680" cy="3283920"/>
+            <a:ext cx="8095320" cy="3283560"/>
           </a:xfrm>
           <a:prstGeom prst="rect">
             <a:avLst/>
@@ -9817,7 +9882,7 @@
         <p:spPr>
           <a:xfrm>
             <a:off x="2117520" y="4707000"/>
-            <a:ext cx="6382800" cy="592920"/>
+            <a:ext cx="6382440" cy="592560"/>
           </a:xfrm>
           <a:prstGeom prst="rect">
             <a:avLst/>
@@ -9843,7 +9908,7 @@
         <p:spPr>
           <a:xfrm>
             <a:off x="8371080" y="2973600"/>
-            <a:ext cx="8095680" cy="3283920"/>
+            <a:ext cx="8095320" cy="3283560"/>
           </a:xfrm>
           <a:prstGeom prst="rect">
             <a:avLst/>
@@ -9918,7 +9983,7 @@
         <p:spPr>
           <a:xfrm>
             <a:off x="1620000" y="216000"/>
-            <a:ext cx="8095680" cy="931680"/>
+            <a:ext cx="8095320" cy="931320"/>
           </a:xfrm>
           <a:prstGeom prst="rect">
             <a:avLst/>
@@ -9982,7 +10047,7 @@
         <p:spPr>
           <a:xfrm>
             <a:off x="1779480" y="1463040"/>
-            <a:ext cx="4712400" cy="2925720"/>
+            <a:ext cx="4712040" cy="2925360"/>
           </a:xfrm>
           <a:prstGeom prst="rect">
             <a:avLst/>
@@ -10016,7 +10081,7 @@
             </a:endParaRPr>
           </a:p>
           <a:p>
-            <a:pPr marL="216000" indent="-215640">
+            <a:pPr marL="216000" indent="-215280">
               <a:lnSpc>
                 <a:spcPct val="100000"/>
               </a:lnSpc>
@@ -10132,7 +10197,7 @@
             </a:endParaRPr>
           </a:p>
           <a:p>
-            <a:pPr marL="216000" indent="-215640">
+            <a:pPr marL="216000" indent="-215280">
               <a:lnSpc>
                 <a:spcPct val="100000"/>
               </a:lnSpc>
@@ -10263,7 +10328,7 @@
             </a:endParaRPr>
           </a:p>
           <a:p>
-            <a:pPr marL="216000" indent="-215640">
+            <a:pPr marL="216000" indent="-215280">
               <a:lnSpc>
                 <a:spcPct val="100000"/>
               </a:lnSpc>
@@ -10371,7 +10436,7 @@
         <p:spPr>
           <a:xfrm>
             <a:off x="1937880" y="4572000"/>
-            <a:ext cx="6382800" cy="592920"/>
+            <a:ext cx="6382440" cy="592560"/>
           </a:xfrm>
           <a:prstGeom prst="rect">
             <a:avLst/>
@@ -10397,7 +10462,7 @@
         <p:spPr>
           <a:xfrm>
             <a:off x="8371080" y="2973600"/>
-            <a:ext cx="8095680" cy="3283920"/>
+            <a:ext cx="8095320" cy="3283560"/>
           </a:xfrm>
           <a:prstGeom prst="rect">
             <a:avLst/>
@@ -10427,7 +10492,7 @@
         <p:spPr>
           <a:xfrm>
             <a:off x="6949440" y="1280160"/>
-            <a:ext cx="2114640" cy="1371240"/>
+            <a:ext cx="2114280" cy="1370880"/>
           </a:xfrm>
           <a:prstGeom prst="rect">
             <a:avLst/>
@@ -10450,7 +10515,7 @@
         <p:spPr>
           <a:xfrm>
             <a:off x="6675120" y="3108960"/>
-            <a:ext cx="3200040" cy="1407960"/>
+            <a:ext cx="3199680" cy="1407600"/>
           </a:xfrm>
           <a:prstGeom prst="rect">
             <a:avLst/>
@@ -10518,7 +10583,7 @@
         <p:spPr>
           <a:xfrm>
             <a:off x="914400" y="253080"/>
-            <a:ext cx="8095680" cy="931680"/>
+            <a:ext cx="8095320" cy="931320"/>
           </a:xfrm>
           <a:prstGeom prst="rect">
             <a:avLst/>
@@ -10539,7 +10604,7 @@
             <a:normAutofit/>
           </a:bodyPr>
           <a:p>
-            <a:pPr lvl="2" marL="648000" indent="-211680" algn="ctr">
+            <a:pPr lvl="2" marL="648000" indent="-211320" algn="ctr">
               <a:lnSpc>
                 <a:spcPct val="100000"/>
               </a:lnSpc>
@@ -10588,7 +10653,7 @@
         <p:spPr>
           <a:xfrm>
             <a:off x="1775880" y="1097280"/>
-            <a:ext cx="8095680" cy="3283920"/>
+            <a:ext cx="8095320" cy="3283560"/>
           </a:xfrm>
           <a:prstGeom prst="rect">
             <a:avLst/>
@@ -10645,7 +10710,7 @@
             </a:endParaRPr>
           </a:p>
           <a:p>
-            <a:pPr marL="571680" indent="-212040">
+            <a:pPr marL="571680" indent="-211680">
               <a:lnSpc>
                 <a:spcPct val="100000"/>
               </a:lnSpc>
@@ -10687,7 +10752,7 @@
             </a:endParaRPr>
           </a:p>
           <a:p>
-            <a:pPr marL="571680" indent="-212040">
+            <a:pPr marL="571680" indent="-211680">
               <a:lnSpc>
                 <a:spcPct val="100000"/>
               </a:lnSpc>
@@ -10729,7 +10794,7 @@
             </a:endParaRPr>
           </a:p>
           <a:p>
-            <a:pPr marL="571680" indent="-212040">
+            <a:pPr marL="571680" indent="-211680">
               <a:lnSpc>
                 <a:spcPct val="100000"/>
               </a:lnSpc>
@@ -10771,7 +10836,7 @@
             </a:endParaRPr>
           </a:p>
           <a:p>
-            <a:pPr marL="571680" indent="-212040">
+            <a:pPr marL="571680" indent="-211680">
               <a:lnSpc>
                 <a:spcPct val="100000"/>
               </a:lnSpc>
@@ -10860,7 +10925,7 @@
         <p:spPr>
           <a:xfrm>
             <a:off x="2837520" y="3017520"/>
-            <a:ext cx="5117400" cy="2552760"/>
+            <a:ext cx="5117040" cy="2552400"/>
           </a:xfrm>
           <a:prstGeom prst="rect">
             <a:avLst/>
@@ -10881,7 +10946,7 @@
         <p:spPr>
           <a:xfrm>
             <a:off x="2834640" y="3108960"/>
-            <a:ext cx="2008800" cy="593640"/>
+            <a:ext cx="2008440" cy="593280"/>
           </a:xfrm>
           <a:prstGeom prst="rect">
             <a:avLst/>
@@ -10947,7 +11012,7 @@
         <p:spPr>
           <a:xfrm>
             <a:off x="3566160" y="4208400"/>
-            <a:ext cx="855000" cy="178920"/>
+            <a:ext cx="854640" cy="178560"/>
           </a:xfrm>
           <a:prstGeom prst="rect">
             <a:avLst/>
@@ -10970,7 +11035,7 @@
         <p:spPr>
           <a:xfrm>
             <a:off x="6675120" y="4206240"/>
-            <a:ext cx="388800" cy="160200"/>
+            <a:ext cx="388440" cy="159840"/>
           </a:xfrm>
           <a:prstGeom prst="rect">
             <a:avLst/>
@@ -11038,7 +11103,7 @@
         <p:spPr>
           <a:xfrm>
             <a:off x="1620000" y="216000"/>
-            <a:ext cx="8095680" cy="931680"/>
+            <a:ext cx="8095320" cy="931320"/>
           </a:xfrm>
           <a:prstGeom prst="rect">
             <a:avLst/>
@@ -11102,7 +11167,7 @@
         <p:spPr>
           <a:xfrm>
             <a:off x="2050560" y="1518480"/>
-            <a:ext cx="8095680" cy="3283920"/>
+            <a:ext cx="8095320" cy="3283560"/>
           </a:xfrm>
           <a:prstGeom prst="rect">
             <a:avLst/>
@@ -11128,7 +11193,7 @@
         <p:spPr>
           <a:xfrm>
             <a:off x="8371080" y="2973600"/>
-            <a:ext cx="8095680" cy="3283920"/>
+            <a:ext cx="8095320" cy="3283560"/>
           </a:xfrm>
           <a:prstGeom prst="rect">
             <a:avLst/>
@@ -11159,7 +11224,7 @@
         <p:spPr>
           <a:xfrm>
             <a:off x="365760" y="1097280"/>
-            <a:ext cx="9510480" cy="4571640"/>
+            <a:ext cx="9510120" cy="4571280"/>
           </a:xfrm>
           <a:prstGeom prst="rect">
             <a:avLst/>
@@ -11227,7 +11292,7 @@
         <p:spPr>
           <a:xfrm>
             <a:off x="1620000" y="216000"/>
-            <a:ext cx="8095680" cy="931680"/>
+            <a:ext cx="8095320" cy="931320"/>
           </a:xfrm>
           <a:prstGeom prst="rect">
             <a:avLst/>
@@ -11284,14 +11349,14 @@
       </p:sp>
       <p:sp>
         <p:nvSpPr>
-          <p:cNvPr id="116" name="TextShape 2"/>
-          <p:cNvSpPr txBox="1"/>
+          <p:cNvPr id="116" name="CustomShape 2"/>
+          <p:cNvSpPr/>
           <p:nvPr/>
         </p:nvSpPr>
         <p:spPr>
           <a:xfrm>
             <a:off x="1828800" y="1280160"/>
-            <a:ext cx="7955280" cy="4243320"/>
+            <a:ext cx="7954920" cy="4242960"/>
           </a:xfrm>
           <a:prstGeom prst="rect">
             <a:avLst/>
@@ -11301,10 +11366,16 @@
             <a:noFill/>
           </a:ln>
         </p:spPr>
+        <p:style>
+          <a:lnRef idx="0"/>
+          <a:fillRef idx="0"/>
+          <a:effectRef idx="0"/>
+          <a:fontRef idx="minor"/>
+        </p:style>
         <p:txBody>
           <a:bodyPr lIns="90000" rIns="90000" tIns="45000" bIns="45000"/>
           <a:p>
-            <a:pPr marL="216000" indent="-216000">
+            <a:pPr marL="216000" indent="-215640">
               <a:lnSpc>
                 <a:spcPct val="115000"/>
               </a:lnSpc>
@@ -11367,11 +11438,28 @@
                 </a:solidFill>
               </a:uFill>
               <a:latin typeface="Arial"/>
-              <a:ea typeface="WenQuanYi Zen Hei Sharp"/>
-            </a:endParaRPr>
-          </a:p>
-          <a:p>
-            <a:pPr marL="216000" indent="-216000">
+            </a:endParaRPr>
+          </a:p>
+          <a:p>
+            <a:pPr>
+              <a:lnSpc>
+                <a:spcPct val="115000"/>
+              </a:lnSpc>
+            </a:pPr>
+            <a:endParaRPr b="0" lang="en-US" sz="1500" spc="-1" strike="noStrike">
+              <a:solidFill>
+                <a:srgbClr val="000000"/>
+              </a:solidFill>
+              <a:uFill>
+                <a:solidFill>
+                  <a:srgbClr val="ffffff"/>
+                </a:solidFill>
+              </a:uFill>
+              <a:latin typeface="Arial"/>
+            </a:endParaRPr>
+          </a:p>
+          <a:p>
+            <a:pPr marL="216000" indent="-215640">
               <a:lnSpc>
                 <a:spcPct val="115000"/>
               </a:lnSpc>
@@ -11382,6 +11470,96 @@
               <a:buFont typeface="Wingdings" charset="2"/>
               <a:buChar char=""/>
             </a:pPr>
+            <a:r>
+              <a:rPr b="1" lang="en-US" sz="1500" spc="-1" strike="noStrike">
+                <a:solidFill>
+                  <a:srgbClr val="000000"/>
+                </a:solidFill>
+                <a:uFill>
+                  <a:solidFill>
+                    <a:srgbClr val="ffffff"/>
+                  </a:solidFill>
+                </a:uFill>
+                <a:latin typeface="Arial"/>
+                <a:ea typeface="WenQuanYi Zen Hei Sharp"/>
+              </a:rPr>
+              <a:t>Network interfaces</a:t>
+            </a:r>
+            <a:r>
+              <a:rPr b="0" lang="en-US" sz="1500" spc="-1" strike="noStrike">
+                <a:solidFill>
+                  <a:srgbClr val="000000"/>
+                </a:solidFill>
+                <a:uFill>
+                  <a:solidFill>
+                    <a:srgbClr val="ffffff"/>
+                  </a:solidFill>
+                </a:uFill>
+                <a:latin typeface="Arial"/>
+                <a:ea typeface="WenQuanYi Zen Hei Sharp"/>
+              </a:rPr>
+              <a:t> are </a:t>
+            </a:r>
+            <a:r>
+              <a:rPr b="1" lang="en-US" sz="1500" spc="-1" strike="noStrike">
+                <a:solidFill>
+                  <a:srgbClr val="000000"/>
+                </a:solidFill>
+                <a:uFill>
+                  <a:solidFill>
+                    <a:srgbClr val="ffffff"/>
+                  </a:solidFill>
+                </a:uFill>
+                <a:latin typeface="Arial"/>
+                <a:ea typeface="WenQuanYi Zen Hei Sharp"/>
+              </a:rPr>
+              <a:t>well defined</a:t>
+            </a:r>
+            <a:r>
+              <a:rPr b="0" lang="en-US" sz="1500" spc="-1" strike="noStrike">
+                <a:solidFill>
+                  <a:srgbClr val="000000"/>
+                </a:solidFill>
+                <a:uFill>
+                  <a:solidFill>
+                    <a:srgbClr val="ffffff"/>
+                  </a:solidFill>
+                </a:uFill>
+                <a:latin typeface="Arial"/>
+                <a:ea typeface="WenQuanYi Zen Hei Sharp"/>
+              </a:rPr>
+              <a:t> </a:t>
+            </a:r>
+            <a:r>
+              <a:rPr b="1" lang="en-US" sz="1500" spc="-1" strike="noStrike">
+                <a:solidFill>
+                  <a:srgbClr val="000000"/>
+                </a:solidFill>
+                <a:uFill>
+                  <a:solidFill>
+                    <a:srgbClr val="ffffff"/>
+                  </a:solidFill>
+                </a:uFill>
+                <a:latin typeface="Arial"/>
+                <a:ea typeface="WenQuanYi Zen Hei Sharp"/>
+              </a:rPr>
+              <a:t>and configured</a:t>
+            </a:r>
+            <a:r>
+              <a:rPr b="0" lang="en-US" sz="1500" spc="-1" strike="noStrike">
+                <a:solidFill>
+                  <a:srgbClr val="000000"/>
+                </a:solidFill>
+                <a:uFill>
+                  <a:solidFill>
+                    <a:srgbClr val="ffffff"/>
+                  </a:solidFill>
+                </a:uFill>
+                <a:latin typeface="Arial"/>
+                <a:ea typeface="WenQuanYi Zen Hei Sharp"/>
+              </a:rPr>
+              <a:t> on both host and virtual operating systems., so that the development work in the project involves only at the application layer and TCP layers of the Network protocol stack.</a:t>
+            </a:r>
             <a:endParaRPr b="0" lang="en-US" sz="1500" spc="-1" strike="noStrike">
               <a:solidFill>
                 <a:srgbClr val="000000"/>
@@ -11392,11 +11570,28 @@
                 </a:solidFill>
               </a:uFill>
               <a:latin typeface="Arial"/>
-              <a:ea typeface="WenQuanYi Zen Hei Sharp"/>
-            </a:endParaRPr>
-          </a:p>
-          <a:p>
-            <a:pPr marL="216000" indent="-216000">
+            </a:endParaRPr>
+          </a:p>
+          <a:p>
+            <a:pPr>
+              <a:lnSpc>
+                <a:spcPct val="115000"/>
+              </a:lnSpc>
+            </a:pPr>
+            <a:endParaRPr b="0" lang="en-US" sz="1500" spc="-1" strike="noStrike">
+              <a:solidFill>
+                <a:srgbClr val="000000"/>
+              </a:solidFill>
+              <a:uFill>
+                <a:solidFill>
+                  <a:srgbClr val="ffffff"/>
+                </a:solidFill>
+              </a:uFill>
+              <a:latin typeface="Arial"/>
+            </a:endParaRPr>
+          </a:p>
+          <a:p>
+            <a:pPr marL="216000" indent="-215640">
               <a:lnSpc>
                 <a:spcPct val="115000"/>
               </a:lnSpc>
@@ -11408,6 +11603,21 @@
               <a:buChar char=""/>
             </a:pPr>
             <a:r>
+              <a:rPr b="0" lang="en-US" sz="1500" spc="-1" strike="noStrike">
+                <a:solidFill>
+                  <a:srgbClr val="000000"/>
+                </a:solidFill>
+                <a:uFill>
+                  <a:solidFill>
+                    <a:srgbClr val="ffffff"/>
+                  </a:solidFill>
+                </a:uFill>
+                <a:latin typeface="Arial"/>
+                <a:ea typeface="WenQuanYi Zen Hei Sharp"/>
+              </a:rPr>
+              <a:t>Linux VM would be readily </a:t>
+            </a:r>
+            <a:r>
               <a:rPr b="1" lang="en-US" sz="1500" spc="-1" strike="noStrike">
                 <a:solidFill>
                   <a:srgbClr val="000000"/>
@@ -11418,8 +11628,9 @@
                   </a:solidFill>
                 </a:uFill>
                 <a:latin typeface="Arial"/>
-              </a:rPr>
-              <a:t>Network interfaces</a:t>
+                <a:ea typeface="WenQuanYi Zen Hei Sharp"/>
+              </a:rPr>
+              <a:t>connecting to</a:t>
             </a:r>
             <a:r>
               <a:rPr b="0" lang="en-US" sz="1500" spc="-1" strike="noStrike">
@@ -11432,8 +11643,9 @@
                   </a:solidFill>
                 </a:uFill>
                 <a:latin typeface="Arial"/>
-              </a:rPr>
-              <a:t> are </a:t>
+                <a:ea typeface="WenQuanYi Zen Hei Sharp"/>
+              </a:rPr>
+              <a:t> </a:t>
             </a:r>
             <a:r>
               <a:rPr b="1" lang="en-US" sz="1500" spc="-1" strike="noStrike">
@@ -11446,8 +11658,9 @@
                   </a:solidFill>
                 </a:uFill>
                 <a:latin typeface="Arial"/>
-              </a:rPr>
-              <a:t>well defined</a:t>
+                <a:ea typeface="WenQuanYi Zen Hei Sharp"/>
+              </a:rPr>
+              <a:t>the</a:t>
             </a:r>
             <a:r>
               <a:rPr b="0" lang="en-US" sz="1500" spc="-1" strike="noStrike">
@@ -11460,6 +11673,7 @@
                   </a:solidFill>
                 </a:uFill>
                 <a:latin typeface="Arial"/>
+                <a:ea typeface="WenQuanYi Zen Hei Sharp"/>
               </a:rPr>
               <a:t> </a:t>
             </a:r>
@@ -11474,8 +11688,9 @@
                   </a:solidFill>
                 </a:uFill>
                 <a:latin typeface="Arial"/>
-              </a:rPr>
-              <a:t>and configured</a:t>
+                <a:ea typeface="WenQuanYi Zen Hei Sharp"/>
+              </a:rPr>
+              <a:t>tool repositories</a:t>
             </a:r>
             <a:r>
               <a:rPr b="0" lang="en-US" sz="1500" spc="-1" strike="noStrike">
@@ -11488,8 +11703,9 @@
                   </a:solidFill>
                 </a:uFill>
                 <a:latin typeface="Arial"/>
-              </a:rPr>
-              <a:t> on both host and virtual operating systems., so that the development work in the project involves only at the application layer and TCP layers of the Network protocol stack.</a:t>
+                <a:ea typeface="WenQuanYi Zen Hei Sharp"/>
+              </a:rPr>
+              <a:t>, which includes RHEL repositories, Prometheus and Grafana download locations, etc.</a:t>
             </a:r>
             <a:endParaRPr b="0" lang="en-US" sz="1500" spc="-1" strike="noStrike">
               <a:solidFill>
@@ -11504,7 +11720,25 @@
             </a:endParaRPr>
           </a:p>
           <a:p>
-            <a:pPr marL="216000" indent="-216000">
+            <a:pPr>
+              <a:lnSpc>
+                <a:spcPct val="115000"/>
+              </a:lnSpc>
+            </a:pPr>
+            <a:endParaRPr b="0" lang="en-US" sz="1500" spc="-1" strike="noStrike">
+              <a:solidFill>
+                <a:srgbClr val="000000"/>
+              </a:solidFill>
+              <a:uFill>
+                <a:solidFill>
+                  <a:srgbClr val="ffffff"/>
+                </a:solidFill>
+              </a:uFill>
+              <a:latin typeface="Arial"/>
+            </a:endParaRPr>
+          </a:p>
+          <a:p>
+            <a:pPr marL="216000" indent="-215640">
               <a:lnSpc>
                 <a:spcPct val="115000"/>
               </a:lnSpc>
@@ -11515,6 +11749,36 @@
               <a:buFont typeface="Wingdings" charset="2"/>
               <a:buChar char=""/>
             </a:pPr>
+            <a:r>
+              <a:rPr b="1" lang="en-US" sz="1500" spc="-1" strike="noStrike">
+                <a:solidFill>
+                  <a:srgbClr val="000000"/>
+                </a:solidFill>
+                <a:uFill>
+                  <a:solidFill>
+                    <a:srgbClr val="ffffff"/>
+                  </a:solidFill>
+                </a:uFill>
+                <a:latin typeface="Arial"/>
+                <a:ea typeface="WenQuanYi Zen Hei Sharp"/>
+              </a:rPr>
+              <a:t>Network firewall rules are enabled</a:t>
+            </a:r>
+            <a:r>
+              <a:rPr b="0" lang="en-US" sz="1500" spc="-1" strike="noStrike">
+                <a:solidFill>
+                  <a:srgbClr val="000000"/>
+                </a:solidFill>
+                <a:uFill>
+                  <a:solidFill>
+                    <a:srgbClr val="ffffff"/>
+                  </a:solidFill>
+                </a:uFill>
+                <a:latin typeface="Arial"/>
+                <a:ea typeface="WenQuanYi Zen Hei Sharp"/>
+              </a:rPr>
+              <a:t> so that access to the TCP ports used for prometheus (9090), node_exporter (9100) and grafana (3000) is available to the host Linux machine.</a:t>
+            </a:r>
             <a:endParaRPr b="0" lang="en-US" sz="1500" spc="-1" strike="noStrike">
               <a:solidFill>
                 <a:srgbClr val="000000"/>
@@ -11528,7 +11792,25 @@
             </a:endParaRPr>
           </a:p>
           <a:p>
-            <a:pPr marL="216000" indent="-216000">
+            <a:pPr>
+              <a:lnSpc>
+                <a:spcPct val="115000"/>
+              </a:lnSpc>
+            </a:pPr>
+            <a:endParaRPr b="0" lang="en-US" sz="1500" spc="-1" strike="noStrike">
+              <a:solidFill>
+                <a:srgbClr val="000000"/>
+              </a:solidFill>
+              <a:uFill>
+                <a:solidFill>
+                  <a:srgbClr val="ffffff"/>
+                </a:solidFill>
+              </a:uFill>
+              <a:latin typeface="Arial"/>
+            </a:endParaRPr>
+          </a:p>
+          <a:p>
+            <a:pPr marL="216000" indent="-215640">
               <a:lnSpc>
                 <a:spcPct val="115000"/>
               </a:lnSpc>
@@ -11540,6 +11822,21 @@
               <a:buChar char=""/>
             </a:pPr>
             <a:r>
+              <a:rPr b="1" lang="en-US" sz="1500" spc="-1" strike="noStrike">
+                <a:solidFill>
+                  <a:srgbClr val="000000"/>
+                </a:solidFill>
+                <a:uFill>
+                  <a:solidFill>
+                    <a:srgbClr val="ffffff"/>
+                  </a:solidFill>
+                </a:uFill>
+                <a:latin typeface="Arial"/>
+                <a:ea typeface="WenQuanYi Zen Hei Sharp"/>
+              </a:rPr>
+              <a:t>SMTP configuration is setup</a:t>
+            </a:r>
+            <a:r>
               <a:rPr b="0" lang="en-US" sz="1500" spc="-1" strike="noStrike">
                 <a:solidFill>
                   <a:srgbClr val="000000"/>
@@ -11550,92 +11847,9 @@
                   </a:solidFill>
                 </a:uFill>
                 <a:latin typeface="Arial"/>
-              </a:rPr>
-              <a:t>Linux VM would be readily </a:t>
-            </a:r>
-            <a:r>
-              <a:rPr b="1" lang="en-US" sz="1500" spc="-1" strike="noStrike">
-                <a:solidFill>
-                  <a:srgbClr val="000000"/>
-                </a:solidFill>
-                <a:uFill>
-                  <a:solidFill>
-                    <a:srgbClr val="ffffff"/>
-                  </a:solidFill>
-                </a:uFill>
-                <a:latin typeface="Arial"/>
-              </a:rPr>
-              <a:t>connecting to</a:t>
-            </a:r>
-            <a:r>
-              <a:rPr b="0" lang="en-US" sz="1500" spc="-1" strike="noStrike">
-                <a:solidFill>
-                  <a:srgbClr val="000000"/>
-                </a:solidFill>
-                <a:uFill>
-                  <a:solidFill>
-                    <a:srgbClr val="ffffff"/>
-                  </a:solidFill>
-                </a:uFill>
-                <a:latin typeface="Arial"/>
-              </a:rPr>
-              <a:t> </a:t>
-            </a:r>
-            <a:r>
-              <a:rPr b="1" lang="en-US" sz="1500" spc="-1" strike="noStrike">
-                <a:solidFill>
-                  <a:srgbClr val="000000"/>
-                </a:solidFill>
-                <a:uFill>
-                  <a:solidFill>
-                    <a:srgbClr val="ffffff"/>
-                  </a:solidFill>
-                </a:uFill>
-                <a:latin typeface="Arial"/>
-              </a:rPr>
-              <a:t>the</a:t>
-            </a:r>
-            <a:r>
-              <a:rPr b="0" lang="en-US" sz="1500" spc="-1" strike="noStrike">
-                <a:solidFill>
-                  <a:srgbClr val="000000"/>
-                </a:solidFill>
-                <a:uFill>
-                  <a:solidFill>
-                    <a:srgbClr val="ffffff"/>
-                  </a:solidFill>
-                </a:uFill>
-                <a:latin typeface="Arial"/>
-              </a:rPr>
-              <a:t> </a:t>
-            </a:r>
-            <a:r>
-              <a:rPr b="1" lang="en-US" sz="1500" spc="-1" strike="noStrike">
-                <a:solidFill>
-                  <a:srgbClr val="000000"/>
-                </a:solidFill>
-                <a:uFill>
-                  <a:solidFill>
-                    <a:srgbClr val="ffffff"/>
-                  </a:solidFill>
-                </a:uFill>
-                <a:latin typeface="Arial"/>
-              </a:rPr>
-              <a:t>tool repositories</a:t>
-            </a:r>
-            <a:r>
-              <a:rPr b="0" lang="en-US" sz="1500" spc="-1" strike="noStrike">
-                <a:solidFill>
-                  <a:srgbClr val="000000"/>
-                </a:solidFill>
-                <a:uFill>
-                  <a:solidFill>
-                    <a:srgbClr val="ffffff"/>
-                  </a:solidFill>
-                </a:uFill>
-                <a:latin typeface="Arial"/>
-              </a:rPr>
-              <a:t>, which includes RHEL repositories, Prometheus and Grafana download locations, etc.</a:t>
+                <a:ea typeface="WenQuanYi Zen Hei Sharp"/>
+              </a:rPr>
+              <a:t> on the Linux VM in order to send the alert messages from Grafana to the support personnel.</a:t>
             </a:r>
             <a:endParaRPr b="0" lang="en-US" sz="1500" spc="-1" strike="noStrike">
               <a:solidFill>
@@ -11650,168 +11864,10 @@
             </a:endParaRPr>
           </a:p>
           <a:p>
-            <a:pPr marL="216000" indent="-216000">
+            <a:pPr>
               <a:lnSpc>
                 <a:spcPct val="115000"/>
               </a:lnSpc>
-              <a:buClr>
-                <a:srgbClr val="000000"/>
-              </a:buClr>
-              <a:buSzPct val="45000"/>
-              <a:buFont typeface="Wingdings" charset="2"/>
-              <a:buChar char=""/>
-            </a:pPr>
-            <a:endParaRPr b="0" lang="en-US" sz="1500" spc="-1" strike="noStrike">
-              <a:solidFill>
-                <a:srgbClr val="000000"/>
-              </a:solidFill>
-              <a:uFill>
-                <a:solidFill>
-                  <a:srgbClr val="ffffff"/>
-                </a:solidFill>
-              </a:uFill>
-              <a:latin typeface="Arial"/>
-            </a:endParaRPr>
-          </a:p>
-          <a:p>
-            <a:pPr marL="216000" indent="-216000">
-              <a:lnSpc>
-                <a:spcPct val="115000"/>
-              </a:lnSpc>
-              <a:buClr>
-                <a:srgbClr val="000000"/>
-              </a:buClr>
-              <a:buSzPct val="45000"/>
-              <a:buFont typeface="Wingdings" charset="2"/>
-              <a:buChar char=""/>
-            </a:pPr>
-            <a:r>
-              <a:rPr b="1" lang="en-US" sz="1500" spc="-1" strike="noStrike">
-                <a:solidFill>
-                  <a:srgbClr val="000000"/>
-                </a:solidFill>
-                <a:uFill>
-                  <a:solidFill>
-                    <a:srgbClr val="ffffff"/>
-                  </a:solidFill>
-                </a:uFill>
-                <a:latin typeface="Arial"/>
-              </a:rPr>
-              <a:t>Network firewall rules are enabled</a:t>
-            </a:r>
-            <a:r>
-              <a:rPr b="0" lang="en-US" sz="1500" spc="-1" strike="noStrike">
-                <a:solidFill>
-                  <a:srgbClr val="000000"/>
-                </a:solidFill>
-                <a:uFill>
-                  <a:solidFill>
-                    <a:srgbClr val="ffffff"/>
-                  </a:solidFill>
-                </a:uFill>
-                <a:latin typeface="Arial"/>
-              </a:rPr>
-              <a:t> so that access to the TCP ports used for prometheus (9090), node_exporter (9100) and grafana (3000) is available to the host Linux machine.</a:t>
-            </a:r>
-            <a:endParaRPr b="0" lang="en-US" sz="1500" spc="-1" strike="noStrike">
-              <a:solidFill>
-                <a:srgbClr val="000000"/>
-              </a:solidFill>
-              <a:uFill>
-                <a:solidFill>
-                  <a:srgbClr val="ffffff"/>
-                </a:solidFill>
-              </a:uFill>
-              <a:latin typeface="Arial"/>
-            </a:endParaRPr>
-          </a:p>
-          <a:p>
-            <a:pPr marL="216000" indent="-216000">
-              <a:lnSpc>
-                <a:spcPct val="115000"/>
-              </a:lnSpc>
-              <a:buClr>
-                <a:srgbClr val="000000"/>
-              </a:buClr>
-              <a:buSzPct val="45000"/>
-              <a:buFont typeface="Wingdings" charset="2"/>
-              <a:buChar char=""/>
-            </a:pPr>
-            <a:endParaRPr b="0" lang="en-US" sz="1500" spc="-1" strike="noStrike">
-              <a:solidFill>
-                <a:srgbClr val="000000"/>
-              </a:solidFill>
-              <a:uFill>
-                <a:solidFill>
-                  <a:srgbClr val="ffffff"/>
-                </a:solidFill>
-              </a:uFill>
-              <a:latin typeface="Arial"/>
-            </a:endParaRPr>
-          </a:p>
-          <a:p>
-            <a:pPr marL="216000" indent="-216000">
-              <a:lnSpc>
-                <a:spcPct val="115000"/>
-              </a:lnSpc>
-              <a:buClr>
-                <a:srgbClr val="000000"/>
-              </a:buClr>
-              <a:buSzPct val="45000"/>
-              <a:buFont typeface="Wingdings" charset="2"/>
-              <a:buChar char=""/>
-            </a:pPr>
-            <a:r>
-              <a:rPr b="1" lang="en-US" sz="1500" spc="-1" strike="noStrike">
-                <a:solidFill>
-                  <a:srgbClr val="000000"/>
-                </a:solidFill>
-                <a:uFill>
-                  <a:solidFill>
-                    <a:srgbClr val="ffffff"/>
-                  </a:solidFill>
-                </a:uFill>
-                <a:latin typeface="Arial"/>
-              </a:rPr>
-              <a:t>SMTP configuration is setup</a:t>
-            </a:r>
-            <a:r>
-              <a:rPr b="0" lang="en-US" sz="1500" spc="-1" strike="noStrike">
-                <a:solidFill>
-                  <a:srgbClr val="000000"/>
-                </a:solidFill>
-                <a:uFill>
-                  <a:solidFill>
-                    <a:srgbClr val="ffffff"/>
-                  </a:solidFill>
-                </a:uFill>
-                <a:latin typeface="Arial"/>
-              </a:rPr>
-              <a:t> on the Linux VM in order to send the alert messages from Grafana to the support personnel.</a:t>
-            </a:r>
-            <a:endParaRPr b="0" lang="en-US" sz="1500" spc="-1" strike="noStrike">
-              <a:solidFill>
-                <a:srgbClr val="000000"/>
-              </a:solidFill>
-              <a:uFill>
-                <a:solidFill>
-                  <a:srgbClr val="ffffff"/>
-                </a:solidFill>
-              </a:uFill>
-              <a:latin typeface="Arial"/>
-            </a:endParaRPr>
-          </a:p>
-          <a:p>
-            <a:pPr marL="216000" indent="-216000">
-              <a:lnSpc>
-                <a:spcPct val="115000"/>
-              </a:lnSpc>
-              <a:buClr>
-                <a:srgbClr val="000000"/>
-              </a:buClr>
-              <a:buSzPct val="45000"/>
-              <a:buFont typeface="Wingdings" charset="2"/>
-              <a:buChar char=""/>
             </a:pPr>
             <a:endParaRPr b="0" lang="en-US" sz="1500" spc="-1" strike="noStrike">
               <a:solidFill>

</xml_diff>

<commit_message>
added final report v0.3
</commit_message>
<xml_diff>
--- a/presentation/PRESENTATION-CSIZG628T-2019HT66015_21Apr21.pptx
+++ b/presentation/PRESENTATION-CSIZG628T-2019HT66015_21Apr21.pptx
@@ -3295,7 +3295,7 @@
         <p:spPr>
           <a:xfrm>
             <a:off x="0" y="0"/>
-            <a:ext cx="10081080" cy="5665320"/>
+            <a:ext cx="10080720" cy="5664960"/>
           </a:xfrm>
           <a:prstGeom prst="rect">
             <a:avLst/>
@@ -3739,7 +3739,7 @@
         <p:spPr>
           <a:xfrm>
             <a:off x="0" y="0"/>
-            <a:ext cx="10081080" cy="5665320"/>
+            <a:ext cx="10080720" cy="5664960"/>
           </a:xfrm>
           <a:prstGeom prst="rect">
             <a:avLst/>
@@ -3784,7 +3784,35 @@
                 </a:uFill>
                 <a:latin typeface="Arial"/>
               </a:rPr>
-              <a:t>Click to edit the title text format</a:t>
+              <a:t>Click to edit </a:t>
+            </a:r>
+            <a:r>
+              <a:rPr b="0" lang="en-US" sz="4400" spc="-1" strike="noStrike">
+                <a:solidFill>
+                  <a:srgbClr val="000000"/>
+                </a:solidFill>
+                <a:uFill>
+                  <a:solidFill>
+                    <a:srgbClr val="ffffff"/>
+                  </a:solidFill>
+                </a:uFill>
+                <a:latin typeface="Arial"/>
+              </a:rPr>
+              <a:t>the title text </a:t>
+            </a:r>
+            <a:r>
+              <a:rPr b="0" lang="en-US" sz="4400" spc="-1" strike="noStrike">
+                <a:solidFill>
+                  <a:srgbClr val="000000"/>
+                </a:solidFill>
+                <a:uFill>
+                  <a:solidFill>
+                    <a:srgbClr val="ffffff"/>
+                  </a:solidFill>
+                </a:uFill>
+                <a:latin typeface="Arial"/>
+              </a:rPr>
+              <a:t>format</a:t>
             </a:r>
             <a:endParaRPr b="0" lang="en-US" sz="4400" spc="-1" strike="noStrike">
               <a:solidFill>
@@ -4137,7 +4165,7 @@
         <p:spPr>
           <a:xfrm>
             <a:off x="1620000" y="1368000"/>
-            <a:ext cx="8095320" cy="3283560"/>
+            <a:ext cx="8094960" cy="3283200"/>
           </a:xfrm>
           <a:prstGeom prst="rect">
             <a:avLst/>
@@ -4497,7 +4525,7 @@
         <p:spPr>
           <a:xfrm>
             <a:off x="678600" y="253080"/>
-            <a:ext cx="8095320" cy="931320"/>
+            <a:ext cx="8094960" cy="930960"/>
           </a:xfrm>
           <a:prstGeom prst="rect">
             <a:avLst/>
@@ -4518,7 +4546,7 @@
             <a:normAutofit/>
           </a:bodyPr>
           <a:p>
-            <a:pPr lvl="2" marL="648000" indent="-211320" algn="ctr">
+            <a:pPr lvl="2" marL="648000" indent="-210960" algn="ctr">
               <a:lnSpc>
                 <a:spcPct val="100000"/>
               </a:lnSpc>
@@ -4526,8 +4554,8 @@
                 <a:srgbClr val="000000"/>
               </a:buClr>
               <a:buSzPct val="45000"/>
-              <a:buFont typeface="Wingdings" charset="2"/>
-              <a:buChar char=""/>
+              <a:buFont typeface="Symbol" charset="2"/>
+              <a:buChar char=""/>
             </a:pPr>
             <a:r>
               <a:rPr b="0" lang="en-US" sz="2600" spc="-1" strike="noStrike">
@@ -4567,7 +4595,7 @@
         <p:spPr>
           <a:xfrm>
             <a:off x="2430360" y="1319040"/>
-            <a:ext cx="6213960" cy="4258080"/>
+            <a:ext cx="6213600" cy="4257720"/>
           </a:xfrm>
           <a:prstGeom prst="rect">
             <a:avLst/>
@@ -4637,7 +4665,7 @@
             </a:endParaRPr>
           </a:p>
           <a:p>
-            <a:pPr marL="216000" indent="-215280">
+            <a:pPr marL="216000" indent="-214920">
               <a:lnSpc>
                 <a:spcPct val="100000"/>
               </a:lnSpc>
@@ -4676,7 +4704,7 @@
             </a:endParaRPr>
           </a:p>
           <a:p>
-            <a:pPr marL="216000" indent="-215280">
+            <a:pPr marL="216000" indent="-214920">
               <a:lnSpc>
                 <a:spcPct val="100000"/>
               </a:lnSpc>
@@ -4784,7 +4812,7 @@
             </a:endParaRPr>
           </a:p>
           <a:p>
-            <a:pPr marL="457200" indent="-215280">
+            <a:pPr marL="457200" indent="-214920">
               <a:lnSpc>
                 <a:spcPct val="115000"/>
               </a:lnSpc>
@@ -4823,7 +4851,7 @@
             </a:endParaRPr>
           </a:p>
           <a:p>
-            <a:pPr marL="457200" indent="-215280">
+            <a:pPr marL="457200" indent="-214920">
               <a:lnSpc>
                 <a:spcPct val="115000"/>
               </a:lnSpc>
@@ -4862,7 +4890,7 @@
             </a:endParaRPr>
           </a:p>
           <a:p>
-            <a:pPr marL="457200" indent="-215280">
+            <a:pPr marL="457200" indent="-214920">
               <a:lnSpc>
                 <a:spcPct val="115000"/>
               </a:lnSpc>
@@ -4901,7 +4929,7 @@
             </a:endParaRPr>
           </a:p>
           <a:p>
-            <a:pPr marL="457200" indent="-215280">
+            <a:pPr marL="457200" indent="-214920">
               <a:lnSpc>
                 <a:spcPct val="115000"/>
               </a:lnSpc>
@@ -4940,7 +4968,7 @@
             </a:endParaRPr>
           </a:p>
           <a:p>
-            <a:pPr marL="457200" indent="-215280">
+            <a:pPr marL="457200" indent="-214920">
               <a:lnSpc>
                 <a:spcPct val="115000"/>
               </a:lnSpc>
@@ -4979,7 +5007,7 @@
             </a:endParaRPr>
           </a:p>
           <a:p>
-            <a:pPr marL="457200" indent="-215280">
+            <a:pPr marL="457200" indent="-214920">
               <a:lnSpc>
                 <a:spcPct val="115000"/>
               </a:lnSpc>
@@ -5018,7 +5046,7 @@
             </a:endParaRPr>
           </a:p>
           <a:p>
-            <a:pPr marL="457200" indent="-215280">
+            <a:pPr marL="457200" indent="-214920">
               <a:lnSpc>
                 <a:spcPct val="115000"/>
               </a:lnSpc>
@@ -5256,7 +5284,7 @@
         <p:spPr>
           <a:xfrm>
             <a:off x="2103120" y="3679560"/>
-            <a:ext cx="4659840" cy="367560"/>
+            <a:ext cx="4659480" cy="367200"/>
           </a:xfrm>
           <a:prstGeom prst="rect">
             <a:avLst/>
@@ -5330,8 +5358,8 @@
         </p:nvSpPr>
         <p:spPr>
           <a:xfrm>
-            <a:off x="3108960" y="1828800"/>
-            <a:ext cx="4571640" cy="1645560"/>
+            <a:off x="2286000" y="1249920"/>
+            <a:ext cx="5669280" cy="2011680"/>
           </a:xfrm>
           <a:prstGeom prst="rect">
             <a:avLst/>
@@ -5350,6 +5378,49 @@
         <p:txBody>
           <a:bodyPr lIns="90000" rIns="90000" tIns="45000" bIns="45000"/>
           <a:p>
+            <a:pPr algn="ctr"/>
+            <a:r>
+              <a:rPr b="1" lang="en-US" sz="2000" spc="-1" strike="noStrike">
+                <a:solidFill>
+                  <a:srgbClr val="000000"/>
+                </a:solidFill>
+                <a:uFill>
+                  <a:solidFill>
+                    <a:srgbClr val="ffffff"/>
+                  </a:solidFill>
+                </a:uFill>
+                <a:latin typeface="Arial"/>
+                <a:ea typeface="DejaVu Sans"/>
+              </a:rPr>
+              <a:t>DEMONSTRATION VIDEO</a:t>
+            </a:r>
+            <a:endParaRPr b="0" lang="en-US" sz="2000" spc="-1" strike="noStrike">
+              <a:solidFill>
+                <a:srgbClr val="000000"/>
+              </a:solidFill>
+              <a:uFill>
+                <a:solidFill>
+                  <a:srgbClr val="ffffff"/>
+                </a:solidFill>
+              </a:uFill>
+              <a:latin typeface="Arial"/>
+            </a:endParaRPr>
+          </a:p>
+          <a:p>
+            <a:pPr algn="ctr"/>
+            <a:endParaRPr b="0" lang="en-US" sz="2000" spc="-1" strike="noStrike">
+              <a:solidFill>
+                <a:srgbClr val="000000"/>
+              </a:solidFill>
+              <a:uFill>
+                <a:solidFill>
+                  <a:srgbClr val="ffffff"/>
+                </a:solidFill>
+              </a:uFill>
+              <a:latin typeface="Arial"/>
+            </a:endParaRPr>
+          </a:p>
+          <a:p>
             <a:r>
               <a:rPr b="1" lang="en-US" sz="1800" spc="-1" strike="noStrike">
                 <a:solidFill>
@@ -5362,8 +5433,9 @@
                 </a:uFill>
                 <a:latin typeface="Arial"/>
                 <a:ea typeface="DejaVu Sans"/>
-              </a:rPr>
-              <a:t>DEMONSTRATION VIDEO</a:t>
+                <a:hlinkClick r:id="rId1"/>
+              </a:rPr>
+              <a:t>https://www.youtube.com/watch?v=J3yoHYbJeJs</a:t>
             </a:r>
             <a:endParaRPr b="0" lang="en-US" sz="1800" spc="-1" strike="noStrike">
               <a:solidFill>
@@ -5391,7 +5463,134 @@
             </a:endParaRPr>
           </a:p>
           <a:p>
-            <a:pPr marL="216000" indent="-215640">
+            <a:endParaRPr b="0" lang="en-US" sz="1800" spc="-1" strike="noStrike">
+              <a:solidFill>
+                <a:srgbClr val="000000"/>
+              </a:solidFill>
+              <a:uFill>
+                <a:solidFill>
+                  <a:srgbClr val="ffffff"/>
+                </a:solidFill>
+              </a:uFill>
+              <a:latin typeface="Arial"/>
+            </a:endParaRPr>
+          </a:p>
+          <a:p>
+            <a:pPr marL="216000" indent="-215280">
+              <a:lnSpc>
+                <a:spcPct val="150000"/>
+              </a:lnSpc>
+              <a:buClr>
+                <a:srgbClr val="000000"/>
+              </a:buClr>
+              <a:buFont typeface="Wingdings" charset="2"/>
+              <a:buChar char=""/>
+            </a:pPr>
+            <a:r>
+              <a:rPr b="0" lang="en-US" sz="1800" spc="-1" strike="noStrike">
+                <a:solidFill>
+                  <a:srgbClr val="000000"/>
+                </a:solidFill>
+                <a:uFill>
+                  <a:solidFill>
+                    <a:srgbClr val="ffffff"/>
+                  </a:solidFill>
+                </a:uFill>
+                <a:latin typeface="Arial"/>
+                <a:ea typeface="DejaVu Sans"/>
+              </a:rPr>
+              <a:t>Automation using Ansible</a:t>
+            </a:r>
+            <a:endParaRPr b="0" lang="en-US" sz="1800" spc="-1" strike="noStrike">
+              <a:solidFill>
+                <a:srgbClr val="000000"/>
+              </a:solidFill>
+              <a:uFill>
+                <a:solidFill>
+                  <a:srgbClr val="ffffff"/>
+                </a:solidFill>
+              </a:uFill>
+              <a:latin typeface="Arial"/>
+            </a:endParaRPr>
+          </a:p>
+          <a:p>
+            <a:pPr marL="216000" indent="-215280">
+              <a:lnSpc>
+                <a:spcPct val="150000"/>
+              </a:lnSpc>
+              <a:buClr>
+                <a:srgbClr val="000000"/>
+              </a:buClr>
+              <a:buFont typeface="Wingdings" charset="2"/>
+              <a:buChar char=""/>
+            </a:pPr>
+            <a:r>
+              <a:rPr b="0" lang="en-US" sz="1800" spc="-1" strike="noStrike">
+                <a:solidFill>
+                  <a:srgbClr val="000000"/>
+                </a:solidFill>
+                <a:uFill>
+                  <a:solidFill>
+                    <a:srgbClr val="ffffff"/>
+                  </a:solidFill>
+                </a:uFill>
+                <a:latin typeface="Arial"/>
+                <a:ea typeface="DejaVu Sans"/>
+              </a:rPr>
+              <a:t>Monitoring with Prometheus</a:t>
+            </a:r>
+            <a:endParaRPr b="0" lang="en-US" sz="1800" spc="-1" strike="noStrike">
+              <a:solidFill>
+                <a:srgbClr val="000000"/>
+              </a:solidFill>
+              <a:uFill>
+                <a:solidFill>
+                  <a:srgbClr val="ffffff"/>
+                </a:solidFill>
+              </a:uFill>
+              <a:latin typeface="Arial"/>
+            </a:endParaRPr>
+          </a:p>
+          <a:p>
+            <a:pPr marL="216000" indent="-215280">
+              <a:lnSpc>
+                <a:spcPct val="150000"/>
+              </a:lnSpc>
+              <a:buClr>
+                <a:srgbClr val="000000"/>
+              </a:buClr>
+              <a:buFont typeface="Wingdings" charset="2"/>
+              <a:buChar char=""/>
+            </a:pPr>
+            <a:r>
+              <a:rPr b="0" lang="en-US" sz="1800" spc="-1" strike="noStrike">
+                <a:solidFill>
+                  <a:srgbClr val="000000"/>
+                </a:solidFill>
+                <a:uFill>
+                  <a:solidFill>
+                    <a:srgbClr val="ffffff"/>
+                  </a:solidFill>
+                </a:uFill>
+                <a:latin typeface="Arial"/>
+                <a:ea typeface="DejaVu Sans"/>
+              </a:rPr>
+              <a:t>Visualization and Alerting with Grafana</a:t>
+            </a:r>
+            <a:endParaRPr b="0" lang="en-US" sz="1800" spc="-1" strike="noStrike">
+              <a:solidFill>
+                <a:srgbClr val="000000"/>
+              </a:solidFill>
+              <a:uFill>
+                <a:solidFill>
+                  <a:srgbClr val="ffffff"/>
+                </a:solidFill>
+              </a:uFill>
+              <a:latin typeface="Arial"/>
+            </a:endParaRPr>
+          </a:p>
+          <a:p>
+            <a:pPr marL="216000" indent="-215280">
               <a:lnSpc>
                 <a:spcPct val="100000"/>
               </a:lnSpc>
@@ -5401,21 +5600,6 @@
               <a:buFont typeface="Wingdings" charset="2"/>
               <a:buChar char=""/>
             </a:pPr>
-            <a:r>
-              <a:rPr b="0" lang="en-US" sz="1800" spc="-1" strike="noStrike">
-                <a:solidFill>
-                  <a:srgbClr val="000000"/>
-                </a:solidFill>
-                <a:uFill>
-                  <a:solidFill>
-                    <a:srgbClr val="ffffff"/>
-                  </a:solidFill>
-                </a:uFill>
-                <a:latin typeface="Arial"/>
-                <a:ea typeface="DejaVu Sans"/>
-              </a:rPr>
-              <a:t>Automation using Ansible</a:t>
-            </a:r>
             <a:endParaRPr b="0" lang="en-US" sz="1800" spc="-1" strike="noStrike">
               <a:solidFill>
                 <a:srgbClr val="000000"/>
@@ -5429,7 +5613,7 @@
             </a:endParaRPr>
           </a:p>
           <a:p>
-            <a:pPr marL="216000" indent="-215640">
+            <a:pPr marL="216000" indent="-215280">
               <a:lnSpc>
                 <a:spcPct val="100000"/>
               </a:lnSpc>
@@ -5439,59 +5623,6 @@
               <a:buFont typeface="Wingdings" charset="2"/>
               <a:buChar char=""/>
             </a:pPr>
-            <a:r>
-              <a:rPr b="0" lang="en-US" sz="1800" spc="-1" strike="noStrike">
-                <a:solidFill>
-                  <a:srgbClr val="000000"/>
-                </a:solidFill>
-                <a:uFill>
-                  <a:solidFill>
-                    <a:srgbClr val="ffffff"/>
-                  </a:solidFill>
-                </a:uFill>
-                <a:latin typeface="Arial"/>
-                <a:ea typeface="DejaVu Sans"/>
-              </a:rPr>
-              <a:t>Monitoring with Prometheus</a:t>
-            </a:r>
-            <a:endParaRPr b="0" lang="en-US" sz="1800" spc="-1" strike="noStrike">
-              <a:solidFill>
-                <a:srgbClr val="000000"/>
-              </a:solidFill>
-              <a:uFill>
-                <a:solidFill>
-                  <a:srgbClr val="ffffff"/>
-                </a:solidFill>
-              </a:uFill>
-              <a:latin typeface="Arial"/>
-            </a:endParaRPr>
-          </a:p>
-          <a:p>
-            <a:pPr marL="216000" indent="-215640">
-              <a:lnSpc>
-                <a:spcPct val="100000"/>
-              </a:lnSpc>
-              <a:buClr>
-                <a:srgbClr val="000000"/>
-              </a:buClr>
-              <a:buFont typeface="Wingdings" charset="2"/>
-              <a:buChar char=""/>
-            </a:pPr>
-            <a:r>
-              <a:rPr b="0" lang="en-US" sz="1800" spc="-1" strike="noStrike">
-                <a:solidFill>
-                  <a:srgbClr val="000000"/>
-                </a:solidFill>
-                <a:uFill>
-                  <a:solidFill>
-                    <a:srgbClr val="ffffff"/>
-                  </a:solidFill>
-                </a:uFill>
-                <a:latin typeface="Arial"/>
-                <a:ea typeface="DejaVu Sans"/>
-              </a:rPr>
-              <a:t>Visualization and Alerting with Grafana</a:t>
-            </a:r>
             <a:endParaRPr b="0" lang="en-US" sz="1800" spc="-1" strike="noStrike">
               <a:solidFill>
                 <a:srgbClr val="000000"/>
@@ -5563,8 +5694,8 @@
         </p:nvSpPr>
         <p:spPr>
           <a:xfrm>
-            <a:off x="678600" y="253080"/>
-            <a:ext cx="8095320" cy="931320"/>
+            <a:off x="683280" y="91440"/>
+            <a:ext cx="8094960" cy="930960"/>
           </a:xfrm>
           <a:prstGeom prst="rect">
             <a:avLst/>
@@ -5585,7 +5716,7 @@
             <a:normAutofit/>
           </a:bodyPr>
           <a:p>
-            <a:pPr lvl="2" marL="648000" indent="-211320" algn="ctr">
+            <a:pPr lvl="2" marL="648000" indent="-210960" algn="ctr">
               <a:lnSpc>
                 <a:spcPct val="100000"/>
               </a:lnSpc>
@@ -5633,8 +5764,8 @@
         </p:nvSpPr>
         <p:spPr>
           <a:xfrm>
-            <a:off x="2103120" y="1097280"/>
-            <a:ext cx="6857640" cy="4468680"/>
+            <a:off x="2103120" y="835200"/>
+            <a:ext cx="6857280" cy="4468320"/>
           </a:xfrm>
           <a:prstGeom prst="rect">
             <a:avLst/>
@@ -5653,7 +5784,7 @@
         <p:txBody>
           <a:bodyPr lIns="90000" rIns="90000" tIns="45000" bIns="45000"/>
           <a:p>
-            <a:pPr marL="216000" indent="-215640">
+            <a:pPr marL="216000" indent="-215280">
               <a:lnSpc>
                 <a:spcPct val="115000"/>
               </a:lnSpc>
@@ -5675,6 +5806,7 @@
                   </a:solidFill>
                 </a:uFill>
                 <a:latin typeface="Arial"/>
+                <a:ea typeface="DejaVu Sans"/>
               </a:rPr>
               <a:t>The study can help students in the future to make extensive study about the fundamental nature of TCP communication between client and server. </a:t>
             </a:r>
@@ -5709,7 +5841,7 @@
             </a:endParaRPr>
           </a:p>
           <a:p>
-            <a:pPr marL="216000" indent="-215640">
+            <a:pPr marL="216000" indent="-215280">
               <a:lnSpc>
                 <a:spcPct val="115000"/>
               </a:lnSpc>
@@ -5731,6 +5863,7 @@
                   </a:solidFill>
                 </a:uFill>
                 <a:latin typeface="Arial"/>
+                <a:ea typeface="DejaVu Sans"/>
               </a:rPr>
               <a:t>Create additional custom metrics for analysing the server behaviour and performance. For example response times to the client requests, number of clients connected to the server can be added to the future scope of the project. </a:t>
             </a:r>
@@ -5765,7 +5898,7 @@
             </a:endParaRPr>
           </a:p>
           <a:p>
-            <a:pPr marL="216000" indent="-215640">
+            <a:pPr marL="216000" indent="-215280">
               <a:lnSpc>
                 <a:spcPct val="115000"/>
               </a:lnSpc>
@@ -5787,6 +5920,7 @@
                   </a:solidFill>
                 </a:uFill>
                 <a:latin typeface="Arial"/>
+                <a:ea typeface="DejaVu Sans"/>
               </a:rPr>
               <a:t>The study can replace TCP Echo Server with any other server like webservers, app servers or db servers by changing a single DockerFile configuration to address the problem of Site Reliability on those servers. </a:t>
             </a:r>
@@ -5821,7 +5955,7 @@
             </a:endParaRPr>
           </a:p>
           <a:p>
-            <a:pPr marL="216000" indent="-215640">
+            <a:pPr marL="216000" indent="-215280">
               <a:lnSpc>
                 <a:spcPct val="115000"/>
               </a:lnSpc>
@@ -5843,6 +5977,7 @@
                   </a:solidFill>
                 </a:uFill>
                 <a:latin typeface="Arial"/>
+                <a:ea typeface="DejaVu Sans"/>
               </a:rPr>
               <a:t>RHEL pre-built OS image can be replaced with free Linux OS like centos or ubuntu, so that entire project can be made available in a public repository.</a:t>
             </a:r>
@@ -5917,8 +6052,8 @@
         </p:nvSpPr>
         <p:spPr>
           <a:xfrm>
-            <a:off x="4023360" y="1463040"/>
-            <a:ext cx="3382560" cy="456480"/>
+            <a:off x="3657600" y="2287080"/>
+            <a:ext cx="3382200" cy="456120"/>
           </a:xfrm>
           <a:prstGeom prst="rect">
             <a:avLst/>
@@ -5950,7 +6085,7 @@
                 <a:latin typeface="Arial"/>
                 <a:ea typeface="DejaVu Sans"/>
               </a:rPr>
-              <a:t>THANK YOU...</a:t>
+              <a:t>THANK YOU.</a:t>
             </a:r>
             <a:endParaRPr b="0" lang="en-US" sz="1800" spc="-1" strike="noStrike">
               <a:solidFill>
@@ -6024,7 +6159,7 @@
         <p:spPr>
           <a:xfrm>
             <a:off x="2011680" y="640080"/>
-            <a:ext cx="7040160" cy="5076000"/>
+            <a:ext cx="7039800" cy="5075640"/>
           </a:xfrm>
           <a:prstGeom prst="rect">
             <a:avLst/>
@@ -7635,7 +7770,7 @@
         <p:spPr>
           <a:xfrm>
             <a:off x="1596600" y="-109080"/>
-            <a:ext cx="8095320" cy="931320"/>
+            <a:ext cx="8094960" cy="930960"/>
           </a:xfrm>
           <a:prstGeom prst="rect">
             <a:avLst/>
@@ -7748,7 +7883,7 @@
         <p:spPr>
           <a:xfrm>
             <a:off x="7040880" y="822960"/>
-            <a:ext cx="2102400" cy="365040"/>
+            <a:ext cx="2102040" cy="364680"/>
           </a:xfrm>
           <a:prstGeom prst="wedgeRoundRectCallout">
             <a:avLst>
@@ -7851,7 +7986,7 @@
         <p:spPr>
           <a:xfrm>
             <a:off x="2079720" y="822960"/>
-            <a:ext cx="2193840" cy="547920"/>
+            <a:ext cx="2193480" cy="547560"/>
           </a:xfrm>
           <a:prstGeom prst="wedgeRoundRectCallout">
             <a:avLst>
@@ -7991,7 +8126,7 @@
         <p:spPr>
           <a:xfrm>
             <a:off x="4425840" y="1539720"/>
-            <a:ext cx="2065680" cy="2208600"/>
+            <a:ext cx="2065320" cy="2208240"/>
           </a:xfrm>
           <a:prstGeom prst="rect">
             <a:avLst/>
@@ -8010,7 +8145,7 @@
         <p:spPr>
           <a:xfrm>
             <a:off x="4920480" y="3017520"/>
-            <a:ext cx="1096560" cy="547920"/>
+            <a:ext cx="1096200" cy="547560"/>
           </a:xfrm>
           <a:prstGeom prst="rect">
             <a:avLst/>
@@ -8067,7 +8202,7 @@
         <p:spPr>
           <a:xfrm>
             <a:off x="1645920" y="2011680"/>
-            <a:ext cx="2193840" cy="456480"/>
+            <a:ext cx="2193480" cy="456120"/>
           </a:xfrm>
           <a:prstGeom prst="wedgeRoundRectCallout">
             <a:avLst>
@@ -8170,7 +8305,7 @@
         <p:spPr>
           <a:xfrm>
             <a:off x="7315200" y="2011680"/>
-            <a:ext cx="2285280" cy="456480"/>
+            <a:ext cx="2284920" cy="456120"/>
           </a:xfrm>
           <a:prstGeom prst="wedgeRoundRectCallout">
             <a:avLst>
@@ -8273,7 +8408,7 @@
         <p:spPr>
           <a:xfrm>
             <a:off x="1737360" y="3657600"/>
-            <a:ext cx="2193840" cy="639360"/>
+            <a:ext cx="2193480" cy="639000"/>
           </a:xfrm>
           <a:prstGeom prst="wedgeRoundRectCallout">
             <a:avLst>
@@ -8442,7 +8577,7 @@
         <p:spPr>
           <a:xfrm>
             <a:off x="7315200" y="3474720"/>
-            <a:ext cx="2559600" cy="547920"/>
+            <a:ext cx="2559240" cy="547560"/>
           </a:xfrm>
           <a:prstGeom prst="wedgeRoundRectCallout">
             <a:avLst>
@@ -8545,7 +8680,7 @@
         <p:spPr>
           <a:xfrm>
             <a:off x="6035040" y="4389120"/>
-            <a:ext cx="2559600" cy="456480"/>
+            <a:ext cx="2559240" cy="456120"/>
           </a:xfrm>
           <a:prstGeom prst="wedgeRoundRectCallout">
             <a:avLst>
@@ -8615,7 +8750,7 @@
         <p:spPr>
           <a:xfrm>
             <a:off x="1596600" y="-109080"/>
-            <a:ext cx="8095320" cy="931320"/>
+            <a:ext cx="8094960" cy="930960"/>
           </a:xfrm>
           <a:prstGeom prst="rect">
             <a:avLst/>
@@ -8728,7 +8863,7 @@
         <p:spPr>
           <a:xfrm>
             <a:off x="1828800" y="792720"/>
-            <a:ext cx="3291120" cy="1584000"/>
+            <a:ext cx="3290760" cy="1583640"/>
           </a:xfrm>
           <a:prstGeom prst="rect">
             <a:avLst/>
@@ -8830,7 +8965,7 @@
         <p:spPr>
           <a:xfrm>
             <a:off x="5577840" y="709560"/>
-            <a:ext cx="4296960" cy="1678320"/>
+            <a:ext cx="4296600" cy="1677960"/>
           </a:xfrm>
           <a:prstGeom prst="rect">
             <a:avLst/>
@@ -8907,7 +9042,7 @@
             </a:endParaRPr>
           </a:p>
           <a:p>
-            <a:pPr marL="216000" indent="-215280">
+            <a:pPr marL="216000" indent="-214920">
               <a:lnSpc>
                 <a:spcPct val="100000"/>
               </a:lnSpc>
@@ -8964,7 +9099,7 @@
             </a:endParaRPr>
           </a:p>
           <a:p>
-            <a:pPr marL="216000" indent="-215280">
+            <a:pPr marL="216000" indent="-214920">
               <a:lnSpc>
                 <a:spcPct val="100000"/>
               </a:lnSpc>
@@ -9013,7 +9148,7 @@
         <p:spPr>
           <a:xfrm>
             <a:off x="2286000" y="2834640"/>
-            <a:ext cx="7131600" cy="2376720"/>
+            <a:ext cx="7131240" cy="2376360"/>
           </a:xfrm>
           <a:prstGeom prst="rect">
             <a:avLst/>
@@ -9225,7 +9360,7 @@
         <p:spPr>
           <a:xfrm>
             <a:off x="1596600" y="-109080"/>
-            <a:ext cx="8095320" cy="931320"/>
+            <a:ext cx="8094960" cy="930960"/>
           </a:xfrm>
           <a:prstGeom prst="rect">
             <a:avLst/>
@@ -9338,7 +9473,7 @@
         <p:spPr>
           <a:xfrm>
             <a:off x="1620000" y="216000"/>
-            <a:ext cx="8095320" cy="931320"/>
+            <a:ext cx="8094960" cy="930960"/>
           </a:xfrm>
           <a:prstGeom prst="rect">
             <a:avLst/>
@@ -9402,7 +9537,7 @@
         <p:spPr>
           <a:xfrm>
             <a:off x="1779480" y="1463040"/>
-            <a:ext cx="8095320" cy="3283560"/>
+            <a:ext cx="8094960" cy="3283200"/>
           </a:xfrm>
           <a:prstGeom prst="rect">
             <a:avLst/>
@@ -9882,7 +10017,7 @@
         <p:spPr>
           <a:xfrm>
             <a:off x="2117520" y="4707000"/>
-            <a:ext cx="6382440" cy="592560"/>
+            <a:ext cx="6382080" cy="592200"/>
           </a:xfrm>
           <a:prstGeom prst="rect">
             <a:avLst/>
@@ -9908,7 +10043,7 @@
         <p:spPr>
           <a:xfrm>
             <a:off x="8371080" y="2973600"/>
-            <a:ext cx="8095320" cy="3283560"/>
+            <a:ext cx="8094960" cy="3283200"/>
           </a:xfrm>
           <a:prstGeom prst="rect">
             <a:avLst/>
@@ -9983,7 +10118,7 @@
         <p:spPr>
           <a:xfrm>
             <a:off x="1620000" y="216000"/>
-            <a:ext cx="8095320" cy="931320"/>
+            <a:ext cx="8094960" cy="930960"/>
           </a:xfrm>
           <a:prstGeom prst="rect">
             <a:avLst/>
@@ -10047,7 +10182,7 @@
         <p:spPr>
           <a:xfrm>
             <a:off x="1779480" y="1463040"/>
-            <a:ext cx="4712040" cy="2925360"/>
+            <a:ext cx="4711680" cy="2925000"/>
           </a:xfrm>
           <a:prstGeom prst="rect">
             <a:avLst/>
@@ -10081,7 +10216,7 @@
             </a:endParaRPr>
           </a:p>
           <a:p>
-            <a:pPr marL="216000" indent="-215280">
+            <a:pPr marL="216000" indent="-214920">
               <a:lnSpc>
                 <a:spcPct val="100000"/>
               </a:lnSpc>
@@ -10197,7 +10332,7 @@
             </a:endParaRPr>
           </a:p>
           <a:p>
-            <a:pPr marL="216000" indent="-215280">
+            <a:pPr marL="216000" indent="-214920">
               <a:lnSpc>
                 <a:spcPct val="100000"/>
               </a:lnSpc>
@@ -10328,7 +10463,7 @@
             </a:endParaRPr>
           </a:p>
           <a:p>
-            <a:pPr marL="216000" indent="-215280">
+            <a:pPr marL="216000" indent="-214920">
               <a:lnSpc>
                 <a:spcPct val="100000"/>
               </a:lnSpc>
@@ -10436,7 +10571,7 @@
         <p:spPr>
           <a:xfrm>
             <a:off x="1937880" y="4572000"/>
-            <a:ext cx="6382440" cy="592560"/>
+            <a:ext cx="6382080" cy="592200"/>
           </a:xfrm>
           <a:prstGeom prst="rect">
             <a:avLst/>
@@ -10462,7 +10597,7 @@
         <p:spPr>
           <a:xfrm>
             <a:off x="8371080" y="2973600"/>
-            <a:ext cx="8095320" cy="3283560"/>
+            <a:ext cx="8094960" cy="3283200"/>
           </a:xfrm>
           <a:prstGeom prst="rect">
             <a:avLst/>
@@ -10492,7 +10627,7 @@
         <p:spPr>
           <a:xfrm>
             <a:off x="6949440" y="1280160"/>
-            <a:ext cx="2114280" cy="1370880"/>
+            <a:ext cx="2113920" cy="1370520"/>
           </a:xfrm>
           <a:prstGeom prst="rect">
             <a:avLst/>
@@ -10515,7 +10650,7 @@
         <p:spPr>
           <a:xfrm>
             <a:off x="6675120" y="3108960"/>
-            <a:ext cx="3199680" cy="1407600"/>
+            <a:ext cx="3199320" cy="1407240"/>
           </a:xfrm>
           <a:prstGeom prst="rect">
             <a:avLst/>
@@ -10583,7 +10718,7 @@
         <p:spPr>
           <a:xfrm>
             <a:off x="914400" y="253080"/>
-            <a:ext cx="8095320" cy="931320"/>
+            <a:ext cx="8094960" cy="930960"/>
           </a:xfrm>
           <a:prstGeom prst="rect">
             <a:avLst/>
@@ -10604,7 +10739,7 @@
             <a:normAutofit/>
           </a:bodyPr>
           <a:p>
-            <a:pPr lvl="2" marL="648000" indent="-211320" algn="ctr">
+            <a:pPr lvl="2" marL="648000" indent="-210960" algn="ctr">
               <a:lnSpc>
                 <a:spcPct val="100000"/>
               </a:lnSpc>
@@ -10653,7 +10788,7 @@
         <p:spPr>
           <a:xfrm>
             <a:off x="1775880" y="1097280"/>
-            <a:ext cx="8095320" cy="3283560"/>
+            <a:ext cx="8094960" cy="3283200"/>
           </a:xfrm>
           <a:prstGeom prst="rect">
             <a:avLst/>
@@ -10710,7 +10845,7 @@
             </a:endParaRPr>
           </a:p>
           <a:p>
-            <a:pPr marL="571680" indent="-211680">
+            <a:pPr marL="571680" indent="-211320">
               <a:lnSpc>
                 <a:spcPct val="100000"/>
               </a:lnSpc>
@@ -10752,7 +10887,7 @@
             </a:endParaRPr>
           </a:p>
           <a:p>
-            <a:pPr marL="571680" indent="-211680">
+            <a:pPr marL="571680" indent="-211320">
               <a:lnSpc>
                 <a:spcPct val="100000"/>
               </a:lnSpc>
@@ -10794,7 +10929,7 @@
             </a:endParaRPr>
           </a:p>
           <a:p>
-            <a:pPr marL="571680" indent="-211680">
+            <a:pPr marL="571680" indent="-211320">
               <a:lnSpc>
                 <a:spcPct val="100000"/>
               </a:lnSpc>
@@ -10836,7 +10971,7 @@
             </a:endParaRPr>
           </a:p>
           <a:p>
-            <a:pPr marL="571680" indent="-211680">
+            <a:pPr marL="571680" indent="-211320">
               <a:lnSpc>
                 <a:spcPct val="100000"/>
               </a:lnSpc>
@@ -10925,7 +11060,7 @@
         <p:spPr>
           <a:xfrm>
             <a:off x="2837520" y="3017520"/>
-            <a:ext cx="5117040" cy="2552400"/>
+            <a:ext cx="5116680" cy="2552040"/>
           </a:xfrm>
           <a:prstGeom prst="rect">
             <a:avLst/>
@@ -10946,7 +11081,7 @@
         <p:spPr>
           <a:xfrm>
             <a:off x="2834640" y="3108960"/>
-            <a:ext cx="2008440" cy="593280"/>
+            <a:ext cx="2008080" cy="592920"/>
           </a:xfrm>
           <a:prstGeom prst="rect">
             <a:avLst/>
@@ -11012,7 +11147,7 @@
         <p:spPr>
           <a:xfrm>
             <a:off x="3566160" y="4208400"/>
-            <a:ext cx="854640" cy="178560"/>
+            <a:ext cx="854280" cy="178200"/>
           </a:xfrm>
           <a:prstGeom prst="rect">
             <a:avLst/>
@@ -11035,7 +11170,7 @@
         <p:spPr>
           <a:xfrm>
             <a:off x="6675120" y="4206240"/>
-            <a:ext cx="388440" cy="159840"/>
+            <a:ext cx="388080" cy="159480"/>
           </a:xfrm>
           <a:prstGeom prst="rect">
             <a:avLst/>
@@ -11103,7 +11238,7 @@
         <p:spPr>
           <a:xfrm>
             <a:off x="1620000" y="216000"/>
-            <a:ext cx="8095320" cy="931320"/>
+            <a:ext cx="8094960" cy="930960"/>
           </a:xfrm>
           <a:prstGeom prst="rect">
             <a:avLst/>
@@ -11167,7 +11302,7 @@
         <p:spPr>
           <a:xfrm>
             <a:off x="2050560" y="1518480"/>
-            <a:ext cx="8095320" cy="3283560"/>
+            <a:ext cx="8094960" cy="3283200"/>
           </a:xfrm>
           <a:prstGeom prst="rect">
             <a:avLst/>
@@ -11193,7 +11328,7 @@
         <p:spPr>
           <a:xfrm>
             <a:off x="8371080" y="2973600"/>
-            <a:ext cx="8095320" cy="3283560"/>
+            <a:ext cx="8094960" cy="3283200"/>
           </a:xfrm>
           <a:prstGeom prst="rect">
             <a:avLst/>
@@ -11224,7 +11359,7 @@
         <p:spPr>
           <a:xfrm>
             <a:off x="365760" y="1097280"/>
-            <a:ext cx="9510120" cy="4571280"/>
+            <a:ext cx="9509760" cy="4570920"/>
           </a:xfrm>
           <a:prstGeom prst="rect">
             <a:avLst/>
@@ -11292,7 +11427,7 @@
         <p:spPr>
           <a:xfrm>
             <a:off x="1620000" y="216000"/>
-            <a:ext cx="8095320" cy="931320"/>
+            <a:ext cx="8094960" cy="930960"/>
           </a:xfrm>
           <a:prstGeom prst="rect">
             <a:avLst/>
@@ -11356,7 +11491,7 @@
         <p:spPr>
           <a:xfrm>
             <a:off x="1828800" y="1280160"/>
-            <a:ext cx="7954920" cy="4242960"/>
+            <a:ext cx="7954560" cy="4242600"/>
           </a:xfrm>
           <a:prstGeom prst="rect">
             <a:avLst/>
@@ -11375,7 +11510,7 @@
         <p:txBody>
           <a:bodyPr lIns="90000" rIns="90000" tIns="45000" bIns="45000"/>
           <a:p>
-            <a:pPr marL="216000" indent="-215640">
+            <a:pPr marL="216000" indent="-215280">
               <a:lnSpc>
                 <a:spcPct val="115000"/>
               </a:lnSpc>
@@ -11397,6 +11532,7 @@
                   </a:solidFill>
                 </a:uFill>
                 <a:latin typeface="Arial"/>
+                <a:ea typeface="DejaVu Sans"/>
               </a:rPr>
               <a:t>RHEL VM is started from a </a:t>
             </a:r>
@@ -11411,6 +11547,7 @@
                   </a:solidFill>
                 </a:uFill>
                 <a:latin typeface="Arial"/>
+                <a:ea typeface="DejaVu Sans"/>
               </a:rPr>
               <a:t>pre-built OS image. </a:t>
             </a:r>
@@ -11425,6 +11562,7 @@
                   </a:solidFill>
                 </a:uFill>
                 <a:latin typeface="Arial"/>
+                <a:ea typeface="DejaVu Sans"/>
               </a:rPr>
               <a:t>Building an image from the scratch is not within the scope in this project.</a:t>
             </a:r>
@@ -11459,7 +11597,7 @@
             </a:endParaRPr>
           </a:p>
           <a:p>
-            <a:pPr marL="216000" indent="-215640">
+            <a:pPr marL="216000" indent="-215280">
               <a:lnSpc>
                 <a:spcPct val="115000"/>
               </a:lnSpc>
@@ -11591,7 +11729,7 @@
             </a:endParaRPr>
           </a:p>
           <a:p>
-            <a:pPr marL="216000" indent="-215640">
+            <a:pPr marL="216000" indent="-215280">
               <a:lnSpc>
                 <a:spcPct val="115000"/>
               </a:lnSpc>
@@ -11738,7 +11876,7 @@
             </a:endParaRPr>
           </a:p>
           <a:p>
-            <a:pPr marL="216000" indent="-215640">
+            <a:pPr marL="216000" indent="-215280">
               <a:lnSpc>
                 <a:spcPct val="115000"/>
               </a:lnSpc>
@@ -11810,7 +11948,7 @@
             </a:endParaRPr>
           </a:p>
           <a:p>
-            <a:pPr marL="216000" indent="-215640">
+            <a:pPr marL="216000" indent="-215280">
               <a:lnSpc>
                 <a:spcPct val="115000"/>
               </a:lnSpc>

</xml_diff>